<commit_message>
1. SPI Mid Presentation update (Final Version) 2. WBS_SPI - Added support in Write to SPI Master's Registers 3. SPI Master - Added BUSY bit
</commit_message>
<xml_diff>
--- a/Presentations/Mid_Presentation/spi_mid_presentation.pptx
+++ b/Presentations/Mid_Presentation/spi_mid_presentation.pptx
@@ -15,7 +15,11 @@
     <p:sldId id="263" r:id="rId9"/>
     <p:sldId id="264" r:id="rId10"/>
     <p:sldId id="265" r:id="rId11"/>
-    <p:sldId id="266" r:id="rId12"/>
+    <p:sldId id="267" r:id="rId12"/>
+    <p:sldId id="266" r:id="rId13"/>
+    <p:sldId id="268" r:id="rId14"/>
+    <p:sldId id="269" r:id="rId15"/>
+    <p:sldId id="270" r:id="rId16"/>
   </p:sldIdLst>
   <p:sldSz cx="9144000" cy="6858000" type="screen4x3"/>
   <p:notesSz cx="6858000" cy="9144000"/>
@@ -298,7 +302,8 @@
           <a:p>
             <a:fld id="{F4D1CDDC-E69E-4CA3-8959-30B5591C52B0}" type="datetimeFigureOut">
               <a:rPr lang="he-IL" smtClean="0"/>
-              <a:t>י"ט/אלול/תשע"א</a:t>
+              <a:pPr/>
+              <a:t>כ"ה/אלול/תשע"א</a:t>
             </a:fld>
             <a:endParaRPr lang="he-IL"/>
           </a:p>
@@ -340,6 +345,7 @@
           <a:p>
             <a:fld id="{242853EF-E89F-4F0E-9068-4421269BB89D}" type="slidenum">
               <a:rPr lang="he-IL" smtClean="0"/>
+              <a:pPr/>
               <a:t>‹#›</a:t>
             </a:fld>
             <a:endParaRPr lang="he-IL"/>
@@ -463,7 +469,8 @@
           <a:p>
             <a:fld id="{F4D1CDDC-E69E-4CA3-8959-30B5591C52B0}" type="datetimeFigureOut">
               <a:rPr lang="he-IL" smtClean="0"/>
-              <a:t>י"ט/אלול/תשע"א</a:t>
+              <a:pPr/>
+              <a:t>כ"ה/אלול/תשע"א</a:t>
             </a:fld>
             <a:endParaRPr lang="he-IL"/>
           </a:p>
@@ -505,6 +512,7 @@
           <a:p>
             <a:fld id="{242853EF-E89F-4F0E-9068-4421269BB89D}" type="slidenum">
               <a:rPr lang="he-IL" smtClean="0"/>
+              <a:pPr/>
               <a:t>‹#›</a:t>
             </a:fld>
             <a:endParaRPr lang="he-IL"/>
@@ -638,7 +646,8 @@
           <a:p>
             <a:fld id="{F4D1CDDC-E69E-4CA3-8959-30B5591C52B0}" type="datetimeFigureOut">
               <a:rPr lang="he-IL" smtClean="0"/>
-              <a:t>י"ט/אלול/תשע"א</a:t>
+              <a:pPr/>
+              <a:t>כ"ה/אלול/תשע"א</a:t>
             </a:fld>
             <a:endParaRPr lang="he-IL"/>
           </a:p>
@@ -680,6 +689,7 @@
           <a:p>
             <a:fld id="{242853EF-E89F-4F0E-9068-4421269BB89D}" type="slidenum">
               <a:rPr lang="he-IL" smtClean="0"/>
+              <a:pPr/>
               <a:t>‹#›</a:t>
             </a:fld>
             <a:endParaRPr lang="he-IL"/>
@@ -803,7 +813,8 @@
           <a:p>
             <a:fld id="{F4D1CDDC-E69E-4CA3-8959-30B5591C52B0}" type="datetimeFigureOut">
               <a:rPr lang="he-IL" smtClean="0"/>
-              <a:t>י"ט/אלול/תשע"א</a:t>
+              <a:pPr/>
+              <a:t>כ"ה/אלול/תשע"א</a:t>
             </a:fld>
             <a:endParaRPr lang="he-IL"/>
           </a:p>
@@ -845,6 +856,7 @@
           <a:p>
             <a:fld id="{242853EF-E89F-4F0E-9068-4421269BB89D}" type="slidenum">
               <a:rPr lang="he-IL" smtClean="0"/>
+              <a:pPr/>
               <a:t>‹#›</a:t>
             </a:fld>
             <a:endParaRPr lang="he-IL"/>
@@ -1044,7 +1056,8 @@
           <a:p>
             <a:fld id="{F4D1CDDC-E69E-4CA3-8959-30B5591C52B0}" type="datetimeFigureOut">
               <a:rPr lang="he-IL" smtClean="0"/>
-              <a:t>י"ט/אלול/תשע"א</a:t>
+              <a:pPr/>
+              <a:t>כ"ה/אלול/תשע"א</a:t>
             </a:fld>
             <a:endParaRPr lang="he-IL"/>
           </a:p>
@@ -1086,6 +1099,7 @@
           <a:p>
             <a:fld id="{242853EF-E89F-4F0E-9068-4421269BB89D}" type="slidenum">
               <a:rPr lang="he-IL" smtClean="0"/>
+              <a:pPr/>
               <a:t>‹#›</a:t>
             </a:fld>
             <a:endParaRPr lang="he-IL"/>
@@ -1327,7 +1341,8 @@
           <a:p>
             <a:fld id="{F4D1CDDC-E69E-4CA3-8959-30B5591C52B0}" type="datetimeFigureOut">
               <a:rPr lang="he-IL" smtClean="0"/>
-              <a:t>י"ט/אלול/תשע"א</a:t>
+              <a:pPr/>
+              <a:t>כ"ה/אלול/תשע"א</a:t>
             </a:fld>
             <a:endParaRPr lang="he-IL"/>
           </a:p>
@@ -1369,6 +1384,7 @@
           <a:p>
             <a:fld id="{242853EF-E89F-4F0E-9068-4421269BB89D}" type="slidenum">
               <a:rPr lang="he-IL" smtClean="0"/>
+              <a:pPr/>
               <a:t>‹#›</a:t>
             </a:fld>
             <a:endParaRPr lang="he-IL"/>
@@ -1744,7 +1760,8 @@
           <a:p>
             <a:fld id="{F4D1CDDC-E69E-4CA3-8959-30B5591C52B0}" type="datetimeFigureOut">
               <a:rPr lang="he-IL" smtClean="0"/>
-              <a:t>י"ט/אלול/תשע"א</a:t>
+              <a:pPr/>
+              <a:t>כ"ה/אלול/תשע"א</a:t>
             </a:fld>
             <a:endParaRPr lang="he-IL"/>
           </a:p>
@@ -1786,6 +1803,7 @@
           <a:p>
             <a:fld id="{242853EF-E89F-4F0E-9068-4421269BB89D}" type="slidenum">
               <a:rPr lang="he-IL" smtClean="0"/>
+              <a:pPr/>
               <a:t>‹#›</a:t>
             </a:fld>
             <a:endParaRPr lang="he-IL"/>
@@ -1857,7 +1875,8 @@
           <a:p>
             <a:fld id="{F4D1CDDC-E69E-4CA3-8959-30B5591C52B0}" type="datetimeFigureOut">
               <a:rPr lang="he-IL" smtClean="0"/>
-              <a:t>י"ט/אלול/תשע"א</a:t>
+              <a:pPr/>
+              <a:t>כ"ה/אלול/תשע"א</a:t>
             </a:fld>
             <a:endParaRPr lang="he-IL"/>
           </a:p>
@@ -1899,6 +1918,7 @@
           <a:p>
             <a:fld id="{242853EF-E89F-4F0E-9068-4421269BB89D}" type="slidenum">
               <a:rPr lang="he-IL" smtClean="0"/>
+              <a:pPr/>
               <a:t>‹#›</a:t>
             </a:fld>
             <a:endParaRPr lang="he-IL"/>
@@ -1947,7 +1967,8 @@
           <a:p>
             <a:fld id="{F4D1CDDC-E69E-4CA3-8959-30B5591C52B0}" type="datetimeFigureOut">
               <a:rPr lang="he-IL" smtClean="0"/>
-              <a:t>י"ט/אלול/תשע"א</a:t>
+              <a:pPr/>
+              <a:t>כ"ה/אלול/תשע"א</a:t>
             </a:fld>
             <a:endParaRPr lang="he-IL"/>
           </a:p>
@@ -1989,6 +2010,7 @@
           <a:p>
             <a:fld id="{242853EF-E89F-4F0E-9068-4421269BB89D}" type="slidenum">
               <a:rPr lang="he-IL" smtClean="0"/>
+              <a:pPr/>
               <a:t>‹#›</a:t>
             </a:fld>
             <a:endParaRPr lang="he-IL"/>
@@ -2219,7 +2241,8 @@
           <a:p>
             <a:fld id="{F4D1CDDC-E69E-4CA3-8959-30B5591C52B0}" type="datetimeFigureOut">
               <a:rPr lang="he-IL" smtClean="0"/>
-              <a:t>י"ט/אלול/תשע"א</a:t>
+              <a:pPr/>
+              <a:t>כ"ה/אלול/תשע"א</a:t>
             </a:fld>
             <a:endParaRPr lang="he-IL"/>
           </a:p>
@@ -2261,6 +2284,7 @@
           <a:p>
             <a:fld id="{242853EF-E89F-4F0E-9068-4421269BB89D}" type="slidenum">
               <a:rPr lang="he-IL" smtClean="0"/>
+              <a:pPr/>
               <a:t>‹#›</a:t>
             </a:fld>
             <a:endParaRPr lang="he-IL"/>
@@ -2467,7 +2491,8 @@
           <a:p>
             <a:fld id="{F4D1CDDC-E69E-4CA3-8959-30B5591C52B0}" type="datetimeFigureOut">
               <a:rPr lang="he-IL" smtClean="0"/>
-              <a:t>י"ט/אלול/תשע"א</a:t>
+              <a:pPr/>
+              <a:t>כ"ה/אלול/תשע"א</a:t>
             </a:fld>
             <a:endParaRPr lang="he-IL"/>
           </a:p>
@@ -2509,6 +2534,7 @@
           <a:p>
             <a:fld id="{242853EF-E89F-4F0E-9068-4421269BB89D}" type="slidenum">
               <a:rPr lang="he-IL" smtClean="0"/>
+              <a:pPr/>
               <a:t>‹#›</a:t>
             </a:fld>
             <a:endParaRPr lang="he-IL"/>
@@ -2527,9 +2553,14 @@
 <p:sldMaster xmlns:a="http://schemas.openxmlformats.org/drawingml/2006/main" xmlns:r="http://schemas.openxmlformats.org/officeDocument/2006/relationships" xmlns:p="http://schemas.openxmlformats.org/presentationml/2006/main">
   <p:cSld>
     <p:bg>
-      <p:bgRef idx="1001">
-        <a:schemeClr val="bg1"/>
-      </p:bgRef>
+      <p:bgPr>
+        <a:blipFill dpi="0" rotWithShape="1">
+          <a:blip r:embed="rId13"/>
+          <a:srcRect/>
+          <a:tile tx="0" ty="0" sx="100000" sy="100000" flip="none" algn="tl"/>
+        </a:blipFill>
+        <a:effectLst/>
+      </p:bgPr>
     </p:bg>
     <p:spTree>
       <p:nvGrpSpPr>
@@ -2675,7 +2706,8 @@
           <a:p>
             <a:fld id="{F4D1CDDC-E69E-4CA3-8959-30B5591C52B0}" type="datetimeFigureOut">
               <a:rPr lang="he-IL" smtClean="0"/>
-              <a:t>י"ט/אלול/תשע"א</a:t>
+              <a:pPr/>
+              <a:t>כ"ה/אלול/תשע"א</a:t>
             </a:fld>
             <a:endParaRPr lang="he-IL"/>
           </a:p>
@@ -2753,6 +2785,7 @@
           <a:p>
             <a:fld id="{242853EF-E89F-4F0E-9068-4421269BB89D}" type="slidenum">
               <a:rPr lang="he-IL" smtClean="0"/>
+              <a:pPr/>
               <a:t>‹#›</a:t>
             </a:fld>
             <a:endParaRPr lang="he-IL"/>
@@ -3114,7 +3147,10 @@
             </a:r>
           </a:p>
           <a:p>
-            <a:pPr algn="l"/>
+            <a:pPr lvl="1" algn="l" rtl="0">
+              <a:buFont typeface="Arial" pitchFamily="34" charset="0"/>
+              <a:buChar char="•"/>
+            </a:pPr>
             <a:r>
               <a:rPr lang="en-US" dirty="0" smtClean="0">
                 <a:solidFill>
@@ -3127,7 +3163,10 @@
             </a:r>
           </a:p>
           <a:p>
-            <a:pPr algn="l"/>
+            <a:pPr lvl="1" algn="l" rtl="0">
+              <a:buFont typeface="Arial" pitchFamily="34" charset="0"/>
+              <a:buChar char="•"/>
+            </a:pPr>
             <a:r>
               <a:rPr lang="en-US" dirty="0" smtClean="0">
                 <a:solidFill>
@@ -3218,7 +3257,7 @@
       </p:sp>
       <p:pic>
         <p:nvPicPr>
-          <p:cNvPr id="11268" name="Picture 4" descr="Technion - Israel institutes of Technology"/>
+          <p:cNvPr id="11266" name="Picture 2" descr="VLSI Systems Research Center, VLSI Laboratory Technion"/>
           <p:cNvPicPr>
             <a:picLocks noChangeAspect="1" noChangeArrowheads="1"/>
           </p:cNvPicPr>
@@ -3233,25 +3272,32 @@
         </p:blipFill>
         <p:spPr bwMode="auto">
           <a:xfrm>
-            <a:off x="0" y="0"/>
-            <a:ext cx="1905000" cy="971551"/>
+            <a:off x="8286776" y="142852"/>
+            <a:ext cx="638175" cy="647700"/>
           </a:xfrm>
           <a:prstGeom prst="rect">
             <a:avLst/>
           </a:prstGeom>
-          <a:noFill/>
+          <a:ln>
+            <a:noFill/>
+          </a:ln>
+          <a:effectLst>
+            <a:outerShdw blurRad="292100" dist="139700" dir="2700000" algn="tl" rotWithShape="0">
+              <a:srgbClr val="333333">
+                <a:alpha val="65000"/>
+              </a:srgbClr>
+            </a:outerShdw>
+          </a:effectLst>
         </p:spPr>
       </p:pic>
       <p:pic>
         <p:nvPicPr>
-          <p:cNvPr id="11266" name="Picture 2" descr="VLSI Systems Research Center, VLSI Laboratory Technion"/>
-          <p:cNvPicPr>
-            <a:picLocks noChangeAspect="1" noChangeArrowheads="1"/>
-          </p:cNvPicPr>
+          <p:cNvPr id="8" name="Picture 7" descr="http://pard.technion.ac.il/archives/Logo/Technion%20logo-1b.jpg"/>
+          <p:cNvPicPr/>
           <p:nvPr/>
         </p:nvPicPr>
         <p:blipFill>
-          <a:blip r:embed="rId3"/>
+          <a:blip r:embed="rId3" cstate="print"/>
           <a:srcRect/>
           <a:stretch>
             <a:fillRect/>
@@ -3259,13 +3305,36 @@
         </p:blipFill>
         <p:spPr bwMode="auto">
           <a:xfrm>
-            <a:off x="1571604" y="142852"/>
-            <a:ext cx="638175" cy="647700"/>
-          </a:xfrm>
-          <a:prstGeom prst="rect">
-            <a:avLst/>
+            <a:off x="0" y="0"/>
+            <a:ext cx="2143108" cy="785794"/>
+          </a:xfrm>
+          <a:prstGeom prst="roundRect">
+            <a:avLst>
+              <a:gd name="adj" fmla="val 16667"/>
+            </a:avLst>
           </a:prstGeom>
-          <a:noFill/>
+          <a:ln>
+            <a:noFill/>
+          </a:ln>
+          <a:effectLst>
+            <a:outerShdw blurRad="152400" dist="12000" dir="900000" sy="98000" kx="110000" ky="200000" algn="tl" rotWithShape="0">
+              <a:srgbClr val="000000">
+                <a:alpha val="30000"/>
+              </a:srgbClr>
+            </a:outerShdw>
+          </a:effectLst>
+          <a:scene3d>
+            <a:camera prst="perspectiveRelaxed">
+              <a:rot lat="19800000" lon="1200000" rev="20820000"/>
+            </a:camera>
+            <a:lightRig rig="threePt" dir="t"/>
+          </a:scene3d>
+          <a:sp3d contourW="6350" prstMaterial="matte">
+            <a:bevelT w="101600" h="101600"/>
+            <a:contourClr>
+              <a:srgbClr val="969696"/>
+            </a:contourClr>
+          </a:sp3d>
         </p:spPr>
       </p:pic>
     </p:spTree>
@@ -3724,7 +3793,7 @@
           <a:p>
             <a:r>
               <a:rPr lang="en-US" dirty="0" smtClean="0"/>
-              <a:t>Schedule</a:t>
+              <a:t>Directory Structure</a:t>
             </a:r>
             <a:endParaRPr lang="he-IL" dirty="0"/>
           </a:p>
@@ -3743,6 +3812,1442 @@
         <p:spPr>
           <a:xfrm>
             <a:off x="357158" y="1643050"/>
+            <a:ext cx="7500990" cy="3214710"/>
+          </a:xfrm>
+        </p:spPr>
+        <p:txBody>
+          <a:bodyPr>
+            <a:normAutofit/>
+          </a:bodyPr>
+          <a:lstStyle/>
+          <a:p>
+            <a:pPr marL="514350" indent="-514350" algn="l" rtl="0">
+              <a:buFont typeface="+mj-lt"/>
+              <a:buAutoNum type="arabicPeriod"/>
+            </a:pPr>
+            <a:r>
+              <a:rPr lang="en-US" dirty="0" smtClean="0">
+                <a:solidFill>
+                  <a:schemeClr val="tx1"/>
+                </a:solidFill>
+              </a:rPr>
+              <a:t>All project files are saved to SVN.</a:t>
+            </a:r>
+            <a:endParaRPr lang="en-US" dirty="0" smtClean="0">
+              <a:solidFill>
+                <a:schemeClr val="tx1"/>
+              </a:solidFill>
+            </a:endParaRPr>
+          </a:p>
+          <a:p>
+            <a:pPr marL="514350" indent="-514350" algn="l" rtl="0"/>
+            <a:endParaRPr lang="en-US" dirty="0" smtClean="0">
+              <a:solidFill>
+                <a:schemeClr val="tx1"/>
+              </a:solidFill>
+            </a:endParaRPr>
+          </a:p>
+        </p:txBody>
+      </p:sp>
+      <p:pic>
+        <p:nvPicPr>
+          <p:cNvPr id="1026" name="Picture 2"/>
+          <p:cNvPicPr>
+            <a:picLocks noChangeAspect="1" noChangeArrowheads="1"/>
+          </p:cNvPicPr>
+          <p:nvPr/>
+        </p:nvPicPr>
+        <p:blipFill>
+          <a:blip r:embed="rId2"/>
+          <a:srcRect/>
+          <a:stretch>
+            <a:fillRect/>
+          </a:stretch>
+        </p:blipFill>
+        <p:spPr bwMode="auto">
+          <a:xfrm>
+            <a:off x="357158" y="3357562"/>
+            <a:ext cx="1095375" cy="571500"/>
+          </a:xfrm>
+          <a:prstGeom prst="rect">
+            <a:avLst/>
+          </a:prstGeom>
+          <a:noFill/>
+          <a:ln w="9525">
+            <a:noFill/>
+            <a:miter lim="800000"/>
+            <a:headEnd/>
+            <a:tailEnd/>
+          </a:ln>
+          <a:effectLst/>
+        </p:spPr>
+      </p:pic>
+      <p:pic>
+        <p:nvPicPr>
+          <p:cNvPr id="1028" name="Picture 4"/>
+          <p:cNvPicPr>
+            <a:picLocks noChangeAspect="1" noChangeArrowheads="1"/>
+          </p:cNvPicPr>
+          <p:nvPr/>
+        </p:nvPicPr>
+        <p:blipFill>
+          <a:blip r:embed="rId3"/>
+          <a:srcRect/>
+          <a:stretch>
+            <a:fillRect/>
+          </a:stretch>
+        </p:blipFill>
+        <p:spPr bwMode="auto">
+          <a:xfrm>
+            <a:off x="2071670" y="3357562"/>
+            <a:ext cx="981075" cy="647700"/>
+          </a:xfrm>
+          <a:prstGeom prst="rect">
+            <a:avLst/>
+          </a:prstGeom>
+          <a:noFill/>
+          <a:ln w="9525">
+            <a:noFill/>
+            <a:miter lim="800000"/>
+            <a:headEnd/>
+            <a:tailEnd/>
+          </a:ln>
+          <a:effectLst/>
+        </p:spPr>
+      </p:pic>
+      <p:pic>
+        <p:nvPicPr>
+          <p:cNvPr id="1029" name="Picture 5"/>
+          <p:cNvPicPr>
+            <a:picLocks noChangeAspect="1" noChangeArrowheads="1"/>
+          </p:cNvPicPr>
+          <p:nvPr/>
+        </p:nvPicPr>
+        <p:blipFill>
+          <a:blip r:embed="rId4"/>
+          <a:srcRect/>
+          <a:stretch>
+            <a:fillRect/>
+          </a:stretch>
+        </p:blipFill>
+        <p:spPr bwMode="auto">
+          <a:xfrm>
+            <a:off x="3643306" y="3357562"/>
+            <a:ext cx="1266825" cy="1000125"/>
+          </a:xfrm>
+          <a:prstGeom prst="rect">
+            <a:avLst/>
+          </a:prstGeom>
+          <a:noFill/>
+          <a:ln w="9525">
+            <a:noFill/>
+            <a:miter lim="800000"/>
+            <a:headEnd/>
+            <a:tailEnd/>
+          </a:ln>
+          <a:effectLst/>
+        </p:spPr>
+      </p:pic>
+      <p:pic>
+        <p:nvPicPr>
+          <p:cNvPr id="1030" name="Picture 6"/>
+          <p:cNvPicPr>
+            <a:picLocks noChangeAspect="1" noChangeArrowheads="1"/>
+          </p:cNvPicPr>
+          <p:nvPr/>
+        </p:nvPicPr>
+        <p:blipFill>
+          <a:blip r:embed="rId5"/>
+          <a:srcRect/>
+          <a:stretch>
+            <a:fillRect/>
+          </a:stretch>
+        </p:blipFill>
+        <p:spPr bwMode="auto">
+          <a:xfrm>
+            <a:off x="5786446" y="2428868"/>
+            <a:ext cx="1343025" cy="1266825"/>
+          </a:xfrm>
+          <a:prstGeom prst="rect">
+            <a:avLst/>
+          </a:prstGeom>
+          <a:noFill/>
+          <a:ln w="9525">
+            <a:noFill/>
+            <a:miter lim="800000"/>
+            <a:headEnd/>
+            <a:tailEnd/>
+          </a:ln>
+          <a:effectLst/>
+        </p:spPr>
+      </p:pic>
+      <p:pic>
+        <p:nvPicPr>
+          <p:cNvPr id="1031" name="Picture 7"/>
+          <p:cNvPicPr>
+            <a:picLocks noChangeAspect="1" noChangeArrowheads="1"/>
+          </p:cNvPicPr>
+          <p:nvPr/>
+        </p:nvPicPr>
+        <p:blipFill>
+          <a:blip r:embed="rId6"/>
+          <a:srcRect/>
+          <a:stretch>
+            <a:fillRect/>
+          </a:stretch>
+        </p:blipFill>
+        <p:spPr bwMode="auto">
+          <a:xfrm>
+            <a:off x="5786446" y="4143380"/>
+            <a:ext cx="1276350" cy="1419225"/>
+          </a:xfrm>
+          <a:prstGeom prst="rect">
+            <a:avLst/>
+          </a:prstGeom>
+          <a:noFill/>
+          <a:ln w="9525">
+            <a:noFill/>
+            <a:miter lim="800000"/>
+            <a:headEnd/>
+            <a:tailEnd/>
+          </a:ln>
+          <a:effectLst/>
+        </p:spPr>
+      </p:pic>
+      <p:sp>
+        <p:nvSpPr>
+          <p:cNvPr id="10" name="Rectangle 9"/>
+          <p:cNvSpPr/>
+          <p:nvPr/>
+        </p:nvSpPr>
+        <p:spPr>
+          <a:xfrm>
+            <a:off x="357158" y="3714752"/>
+            <a:ext cx="803940" cy="232408"/>
+          </a:xfrm>
+          <a:prstGeom prst="rect">
+            <a:avLst/>
+          </a:prstGeom>
+          <a:solidFill>
+            <a:schemeClr val="accent1">
+              <a:alpha val="27000"/>
+            </a:schemeClr>
+          </a:solidFill>
+        </p:spPr>
+        <p:style>
+          <a:lnRef idx="2">
+            <a:schemeClr val="accent1">
+              <a:shade val="50000"/>
+            </a:schemeClr>
+          </a:lnRef>
+          <a:fillRef idx="1">
+            <a:schemeClr val="accent1"/>
+          </a:fillRef>
+          <a:effectRef idx="0">
+            <a:schemeClr val="accent1"/>
+          </a:effectRef>
+          <a:fontRef idx="minor">
+            <a:schemeClr val="lt1"/>
+          </a:fontRef>
+        </p:style>
+        <p:txBody>
+          <a:bodyPr rtlCol="1" anchor="ctr"/>
+          <a:lstStyle/>
+          <a:p>
+            <a:pPr algn="ctr"/>
+            <a:endParaRPr lang="he-IL"/>
+          </a:p>
+        </p:txBody>
+      </p:sp>
+      <p:sp>
+        <p:nvSpPr>
+          <p:cNvPr id="11" name="Rectangle 10"/>
+          <p:cNvSpPr/>
+          <p:nvPr/>
+        </p:nvSpPr>
+        <p:spPr>
+          <a:xfrm>
+            <a:off x="2071682" y="3348988"/>
+            <a:ext cx="803940" cy="232408"/>
+          </a:xfrm>
+          <a:prstGeom prst="rect">
+            <a:avLst/>
+          </a:prstGeom>
+          <a:solidFill>
+            <a:schemeClr val="accent1">
+              <a:alpha val="27000"/>
+            </a:schemeClr>
+          </a:solidFill>
+        </p:spPr>
+        <p:style>
+          <a:lnRef idx="2">
+            <a:schemeClr val="accent1">
+              <a:shade val="50000"/>
+            </a:schemeClr>
+          </a:lnRef>
+          <a:fillRef idx="1">
+            <a:schemeClr val="accent1"/>
+          </a:fillRef>
+          <a:effectRef idx="0">
+            <a:schemeClr val="accent1"/>
+          </a:effectRef>
+          <a:fontRef idx="minor">
+            <a:schemeClr val="lt1"/>
+          </a:fontRef>
+        </p:style>
+        <p:txBody>
+          <a:bodyPr rtlCol="1" anchor="ctr"/>
+          <a:lstStyle/>
+          <a:p>
+            <a:pPr algn="ctr"/>
+            <a:endParaRPr lang="he-IL"/>
+          </a:p>
+        </p:txBody>
+      </p:sp>
+      <p:sp>
+        <p:nvSpPr>
+          <p:cNvPr id="12" name="Rectangle 11"/>
+          <p:cNvSpPr/>
+          <p:nvPr/>
+        </p:nvSpPr>
+        <p:spPr>
+          <a:xfrm>
+            <a:off x="2396512" y="3589016"/>
+            <a:ext cx="499088" cy="213364"/>
+          </a:xfrm>
+          <a:prstGeom prst="rect">
+            <a:avLst/>
+          </a:prstGeom>
+          <a:solidFill>
+            <a:schemeClr val="accent1">
+              <a:alpha val="27000"/>
+            </a:schemeClr>
+          </a:solidFill>
+        </p:spPr>
+        <p:style>
+          <a:lnRef idx="2">
+            <a:schemeClr val="accent1">
+              <a:shade val="50000"/>
+            </a:schemeClr>
+          </a:lnRef>
+          <a:fillRef idx="1">
+            <a:schemeClr val="accent1"/>
+          </a:fillRef>
+          <a:effectRef idx="0">
+            <a:schemeClr val="accent1"/>
+          </a:effectRef>
+          <a:fontRef idx="minor">
+            <a:schemeClr val="lt1"/>
+          </a:fontRef>
+        </p:style>
+        <p:txBody>
+          <a:bodyPr rtlCol="1" anchor="ctr"/>
+          <a:lstStyle/>
+          <a:p>
+            <a:pPr algn="ctr"/>
+            <a:endParaRPr lang="he-IL"/>
+          </a:p>
+        </p:txBody>
+      </p:sp>
+      <p:sp>
+        <p:nvSpPr>
+          <p:cNvPr id="13" name="Rectangle 12"/>
+          <p:cNvSpPr/>
+          <p:nvPr/>
+        </p:nvSpPr>
+        <p:spPr>
+          <a:xfrm>
+            <a:off x="3645278" y="3341360"/>
+            <a:ext cx="690502" cy="209560"/>
+          </a:xfrm>
+          <a:prstGeom prst="rect">
+            <a:avLst/>
+          </a:prstGeom>
+          <a:solidFill>
+            <a:schemeClr val="accent1">
+              <a:alpha val="27000"/>
+            </a:schemeClr>
+          </a:solidFill>
+        </p:spPr>
+        <p:style>
+          <a:lnRef idx="2">
+            <a:schemeClr val="accent1">
+              <a:shade val="50000"/>
+            </a:schemeClr>
+          </a:lnRef>
+          <a:fillRef idx="1">
+            <a:schemeClr val="accent1"/>
+          </a:fillRef>
+          <a:effectRef idx="0">
+            <a:schemeClr val="accent1"/>
+          </a:effectRef>
+          <a:fontRef idx="minor">
+            <a:schemeClr val="lt1"/>
+          </a:fontRef>
+        </p:style>
+        <p:txBody>
+          <a:bodyPr rtlCol="1" anchor="ctr"/>
+          <a:lstStyle/>
+          <a:p>
+            <a:pPr algn="ctr"/>
+            <a:endParaRPr lang="he-IL"/>
+          </a:p>
+        </p:txBody>
+      </p:sp>
+      <p:sp>
+        <p:nvSpPr>
+          <p:cNvPr id="14" name="Rectangle 13"/>
+          <p:cNvSpPr/>
+          <p:nvPr/>
+        </p:nvSpPr>
+        <p:spPr>
+          <a:xfrm>
+            <a:off x="3999642" y="3711878"/>
+            <a:ext cx="892398" cy="220042"/>
+          </a:xfrm>
+          <a:prstGeom prst="rect">
+            <a:avLst/>
+          </a:prstGeom>
+          <a:solidFill>
+            <a:schemeClr val="accent1">
+              <a:alpha val="27000"/>
+            </a:schemeClr>
+          </a:solidFill>
+        </p:spPr>
+        <p:style>
+          <a:lnRef idx="2">
+            <a:schemeClr val="accent1">
+              <a:shade val="50000"/>
+            </a:schemeClr>
+          </a:lnRef>
+          <a:fillRef idx="1">
+            <a:schemeClr val="accent1"/>
+          </a:fillRef>
+          <a:effectRef idx="0">
+            <a:schemeClr val="accent1"/>
+          </a:effectRef>
+          <a:fontRef idx="minor">
+            <a:schemeClr val="lt1"/>
+          </a:fontRef>
+        </p:style>
+        <p:txBody>
+          <a:bodyPr rtlCol="1" anchor="ctr"/>
+          <a:lstStyle/>
+          <a:p>
+            <a:pPr algn="ctr"/>
+            <a:endParaRPr lang="he-IL"/>
+          </a:p>
+        </p:txBody>
+      </p:sp>
+      <p:sp>
+        <p:nvSpPr>
+          <p:cNvPr id="15" name="Rectangle 14"/>
+          <p:cNvSpPr/>
+          <p:nvPr/>
+        </p:nvSpPr>
+        <p:spPr>
+          <a:xfrm>
+            <a:off x="6186614" y="2808898"/>
+            <a:ext cx="892398" cy="220042"/>
+          </a:xfrm>
+          <a:prstGeom prst="rect">
+            <a:avLst/>
+          </a:prstGeom>
+          <a:solidFill>
+            <a:schemeClr val="accent1">
+              <a:alpha val="27000"/>
+            </a:schemeClr>
+          </a:solidFill>
+        </p:spPr>
+        <p:style>
+          <a:lnRef idx="2">
+            <a:schemeClr val="accent1">
+              <a:shade val="50000"/>
+            </a:schemeClr>
+          </a:lnRef>
+          <a:fillRef idx="1">
+            <a:schemeClr val="accent1"/>
+          </a:fillRef>
+          <a:effectRef idx="0">
+            <a:schemeClr val="accent1"/>
+          </a:effectRef>
+          <a:fontRef idx="minor">
+            <a:schemeClr val="lt1"/>
+          </a:fontRef>
+        </p:style>
+        <p:txBody>
+          <a:bodyPr rtlCol="1" anchor="ctr"/>
+          <a:lstStyle/>
+          <a:p>
+            <a:pPr algn="ctr"/>
+            <a:endParaRPr lang="he-IL"/>
+          </a:p>
+        </p:txBody>
+      </p:sp>
+      <p:sp>
+        <p:nvSpPr>
+          <p:cNvPr id="16" name="Rectangle 15"/>
+          <p:cNvSpPr/>
+          <p:nvPr/>
+        </p:nvSpPr>
+        <p:spPr>
+          <a:xfrm>
+            <a:off x="4001582" y="4101440"/>
+            <a:ext cx="517078" cy="234340"/>
+          </a:xfrm>
+          <a:prstGeom prst="rect">
+            <a:avLst/>
+          </a:prstGeom>
+          <a:solidFill>
+            <a:schemeClr val="accent1">
+              <a:alpha val="27000"/>
+            </a:schemeClr>
+          </a:solidFill>
+        </p:spPr>
+        <p:style>
+          <a:lnRef idx="2">
+            <a:schemeClr val="accent1">
+              <a:shade val="50000"/>
+            </a:schemeClr>
+          </a:lnRef>
+          <a:fillRef idx="1">
+            <a:schemeClr val="accent1"/>
+          </a:fillRef>
+          <a:effectRef idx="0">
+            <a:schemeClr val="accent1"/>
+          </a:effectRef>
+          <a:fontRef idx="minor">
+            <a:schemeClr val="lt1"/>
+          </a:fontRef>
+        </p:style>
+        <p:txBody>
+          <a:bodyPr rtlCol="1" anchor="ctr"/>
+          <a:lstStyle/>
+          <a:p>
+            <a:pPr algn="ctr"/>
+            <a:endParaRPr lang="he-IL"/>
+          </a:p>
+        </p:txBody>
+      </p:sp>
+      <p:sp>
+        <p:nvSpPr>
+          <p:cNvPr id="17" name="Rectangle 16"/>
+          <p:cNvSpPr/>
+          <p:nvPr/>
+        </p:nvSpPr>
+        <p:spPr>
+          <a:xfrm>
+            <a:off x="6124724" y="4922480"/>
+            <a:ext cx="519916" cy="213400"/>
+          </a:xfrm>
+          <a:prstGeom prst="rect">
+            <a:avLst/>
+          </a:prstGeom>
+          <a:solidFill>
+            <a:schemeClr val="accent1">
+              <a:alpha val="27000"/>
+            </a:schemeClr>
+          </a:solidFill>
+        </p:spPr>
+        <p:style>
+          <a:lnRef idx="2">
+            <a:schemeClr val="accent1">
+              <a:shade val="50000"/>
+            </a:schemeClr>
+          </a:lnRef>
+          <a:fillRef idx="1">
+            <a:schemeClr val="accent1"/>
+          </a:fillRef>
+          <a:effectRef idx="0">
+            <a:schemeClr val="accent1"/>
+          </a:effectRef>
+          <a:fontRef idx="minor">
+            <a:schemeClr val="lt1"/>
+          </a:fontRef>
+        </p:style>
+        <p:txBody>
+          <a:bodyPr rtlCol="1" anchor="ctr"/>
+          <a:lstStyle/>
+          <a:p>
+            <a:pPr algn="ctr"/>
+            <a:endParaRPr lang="he-IL"/>
+          </a:p>
+        </p:txBody>
+      </p:sp>
+    </p:spTree>
+  </p:cSld>
+  <p:clrMapOvr>
+    <a:masterClrMapping/>
+  </p:clrMapOvr>
+  <p:timing>
+    <p:tnLst>
+      <p:par>
+        <p:cTn id="1" dur="indefinite" restart="never" nodeType="tmRoot">
+          <p:childTnLst>
+            <p:seq concurrent="1" nextAc="seek">
+              <p:cTn id="2" dur="indefinite" nodeType="mainSeq">
+                <p:childTnLst>
+                  <p:par>
+                    <p:cTn id="3" fill="hold">
+                      <p:stCondLst>
+                        <p:cond delay="indefinite"/>
+                      </p:stCondLst>
+                      <p:childTnLst>
+                        <p:par>
+                          <p:cTn id="4" fill="hold">
+                            <p:stCondLst>
+                              <p:cond delay="0"/>
+                            </p:stCondLst>
+                            <p:childTnLst>
+                              <p:par>
+                                <p:cTn id="5" presetID="3" presetClass="entr" presetSubtype="10" fill="hold" nodeType="clickEffect">
+                                  <p:stCondLst>
+                                    <p:cond delay="0"/>
+                                  </p:stCondLst>
+                                  <p:childTnLst>
+                                    <p:set>
+                                      <p:cBhvr>
+                                        <p:cTn id="6" dur="1" fill="hold">
+                                          <p:stCondLst>
+                                            <p:cond delay="0"/>
+                                          </p:stCondLst>
+                                        </p:cTn>
+                                        <p:tgtEl>
+                                          <p:spTgt spid="3">
+                                            <p:txEl>
+                                              <p:pRg st="0" end="0"/>
+                                            </p:txEl>
+                                          </p:spTgt>
+                                        </p:tgtEl>
+                                        <p:attrNameLst>
+                                          <p:attrName>style.visibility</p:attrName>
+                                        </p:attrNameLst>
+                                      </p:cBhvr>
+                                      <p:to>
+                                        <p:strVal val="visible"/>
+                                      </p:to>
+                                    </p:set>
+                                    <p:animEffect transition="in" filter="blinds(horizontal)">
+                                      <p:cBhvr>
+                                        <p:cTn id="7" dur="500"/>
+                                        <p:tgtEl>
+                                          <p:spTgt spid="3">
+                                            <p:txEl>
+                                              <p:pRg st="0" end="0"/>
+                                            </p:txEl>
+                                          </p:spTgt>
+                                        </p:tgtEl>
+                                      </p:cBhvr>
+                                    </p:animEffect>
+                                  </p:childTnLst>
+                                </p:cTn>
+                              </p:par>
+                            </p:childTnLst>
+                          </p:cTn>
+                        </p:par>
+                      </p:childTnLst>
+                    </p:cTn>
+                  </p:par>
+                  <p:par>
+                    <p:cTn id="8" fill="hold">
+                      <p:stCondLst>
+                        <p:cond delay="indefinite"/>
+                      </p:stCondLst>
+                      <p:childTnLst>
+                        <p:par>
+                          <p:cTn id="9" fill="hold">
+                            <p:stCondLst>
+                              <p:cond delay="0"/>
+                            </p:stCondLst>
+                            <p:childTnLst>
+                              <p:par>
+                                <p:cTn id="10" presetID="3" presetClass="entr" presetSubtype="10" fill="hold" nodeType="clickEffect">
+                                  <p:stCondLst>
+                                    <p:cond delay="0"/>
+                                  </p:stCondLst>
+                                  <p:childTnLst>
+                                    <p:set>
+                                      <p:cBhvr>
+                                        <p:cTn id="11" dur="1" fill="hold">
+                                          <p:stCondLst>
+                                            <p:cond delay="0"/>
+                                          </p:stCondLst>
+                                        </p:cTn>
+                                        <p:tgtEl>
+                                          <p:spTgt spid="1026"/>
+                                        </p:tgtEl>
+                                        <p:attrNameLst>
+                                          <p:attrName>style.visibility</p:attrName>
+                                        </p:attrNameLst>
+                                      </p:cBhvr>
+                                      <p:to>
+                                        <p:strVal val="visible"/>
+                                      </p:to>
+                                    </p:set>
+                                    <p:animEffect transition="in" filter="blinds(horizontal)">
+                                      <p:cBhvr>
+                                        <p:cTn id="12" dur="500"/>
+                                        <p:tgtEl>
+                                          <p:spTgt spid="1026"/>
+                                        </p:tgtEl>
+                                      </p:cBhvr>
+                                    </p:animEffect>
+                                  </p:childTnLst>
+                                </p:cTn>
+                              </p:par>
+                            </p:childTnLst>
+                          </p:cTn>
+                        </p:par>
+                      </p:childTnLst>
+                    </p:cTn>
+                  </p:par>
+                  <p:par>
+                    <p:cTn id="13" fill="hold">
+                      <p:stCondLst>
+                        <p:cond delay="indefinite"/>
+                      </p:stCondLst>
+                      <p:childTnLst>
+                        <p:par>
+                          <p:cTn id="14" fill="hold">
+                            <p:stCondLst>
+                              <p:cond delay="0"/>
+                            </p:stCondLst>
+                            <p:childTnLst>
+                              <p:par>
+                                <p:cTn id="15" presetID="3" presetClass="entr" presetSubtype="10" fill="hold" nodeType="clickEffect">
+                                  <p:stCondLst>
+                                    <p:cond delay="0"/>
+                                  </p:stCondLst>
+                                  <p:childTnLst>
+                                    <p:set>
+                                      <p:cBhvr>
+                                        <p:cTn id="16" dur="1" fill="hold">
+                                          <p:stCondLst>
+                                            <p:cond delay="0"/>
+                                          </p:stCondLst>
+                                        </p:cTn>
+                                        <p:tgtEl>
+                                          <p:spTgt spid="1028"/>
+                                        </p:tgtEl>
+                                        <p:attrNameLst>
+                                          <p:attrName>style.visibility</p:attrName>
+                                        </p:attrNameLst>
+                                      </p:cBhvr>
+                                      <p:to>
+                                        <p:strVal val="visible"/>
+                                      </p:to>
+                                    </p:set>
+                                    <p:animEffect transition="in" filter="blinds(horizontal)">
+                                      <p:cBhvr>
+                                        <p:cTn id="17" dur="500"/>
+                                        <p:tgtEl>
+                                          <p:spTgt spid="1028"/>
+                                        </p:tgtEl>
+                                      </p:cBhvr>
+                                    </p:animEffect>
+                                  </p:childTnLst>
+                                </p:cTn>
+                              </p:par>
+                              <p:par>
+                                <p:cTn id="18" presetID="3" presetClass="entr" presetSubtype="10" fill="hold" grpId="0" nodeType="withEffect">
+                                  <p:stCondLst>
+                                    <p:cond delay="0"/>
+                                  </p:stCondLst>
+                                  <p:childTnLst>
+                                    <p:set>
+                                      <p:cBhvr>
+                                        <p:cTn id="19" dur="1" fill="hold">
+                                          <p:stCondLst>
+                                            <p:cond delay="0"/>
+                                          </p:stCondLst>
+                                        </p:cTn>
+                                        <p:tgtEl>
+                                          <p:spTgt spid="10"/>
+                                        </p:tgtEl>
+                                        <p:attrNameLst>
+                                          <p:attrName>style.visibility</p:attrName>
+                                        </p:attrNameLst>
+                                      </p:cBhvr>
+                                      <p:to>
+                                        <p:strVal val="visible"/>
+                                      </p:to>
+                                    </p:set>
+                                    <p:animEffect transition="in" filter="blinds(horizontal)">
+                                      <p:cBhvr>
+                                        <p:cTn id="20" dur="500"/>
+                                        <p:tgtEl>
+                                          <p:spTgt spid="10"/>
+                                        </p:tgtEl>
+                                      </p:cBhvr>
+                                    </p:animEffect>
+                                  </p:childTnLst>
+                                </p:cTn>
+                              </p:par>
+                              <p:par>
+                                <p:cTn id="21" presetID="3" presetClass="entr" presetSubtype="10" fill="hold" grpId="0" nodeType="withEffect">
+                                  <p:stCondLst>
+                                    <p:cond delay="0"/>
+                                  </p:stCondLst>
+                                  <p:childTnLst>
+                                    <p:set>
+                                      <p:cBhvr>
+                                        <p:cTn id="22" dur="1" fill="hold">
+                                          <p:stCondLst>
+                                            <p:cond delay="0"/>
+                                          </p:stCondLst>
+                                        </p:cTn>
+                                        <p:tgtEl>
+                                          <p:spTgt spid="11"/>
+                                        </p:tgtEl>
+                                        <p:attrNameLst>
+                                          <p:attrName>style.visibility</p:attrName>
+                                        </p:attrNameLst>
+                                      </p:cBhvr>
+                                      <p:to>
+                                        <p:strVal val="visible"/>
+                                      </p:to>
+                                    </p:set>
+                                    <p:animEffect transition="in" filter="blinds(horizontal)">
+                                      <p:cBhvr>
+                                        <p:cTn id="23" dur="500"/>
+                                        <p:tgtEl>
+                                          <p:spTgt spid="11"/>
+                                        </p:tgtEl>
+                                      </p:cBhvr>
+                                    </p:animEffect>
+                                  </p:childTnLst>
+                                </p:cTn>
+                              </p:par>
+                            </p:childTnLst>
+                          </p:cTn>
+                        </p:par>
+                      </p:childTnLst>
+                    </p:cTn>
+                  </p:par>
+                  <p:par>
+                    <p:cTn id="24" fill="hold">
+                      <p:stCondLst>
+                        <p:cond delay="indefinite"/>
+                      </p:stCondLst>
+                      <p:childTnLst>
+                        <p:par>
+                          <p:cTn id="25" fill="hold">
+                            <p:stCondLst>
+                              <p:cond delay="0"/>
+                            </p:stCondLst>
+                            <p:childTnLst>
+                              <p:par>
+                                <p:cTn id="26" presetID="3" presetClass="exit" presetSubtype="10" fill="hold" grpId="1" nodeType="clickEffect">
+                                  <p:stCondLst>
+                                    <p:cond delay="0"/>
+                                  </p:stCondLst>
+                                  <p:childTnLst>
+                                    <p:animEffect transition="out" filter="blinds(horizontal)">
+                                      <p:cBhvr>
+                                        <p:cTn id="27" dur="500"/>
+                                        <p:tgtEl>
+                                          <p:spTgt spid="11"/>
+                                        </p:tgtEl>
+                                      </p:cBhvr>
+                                    </p:animEffect>
+                                    <p:set>
+                                      <p:cBhvr>
+                                        <p:cTn id="28" dur="1" fill="hold">
+                                          <p:stCondLst>
+                                            <p:cond delay="499"/>
+                                          </p:stCondLst>
+                                        </p:cTn>
+                                        <p:tgtEl>
+                                          <p:spTgt spid="11"/>
+                                        </p:tgtEl>
+                                        <p:attrNameLst>
+                                          <p:attrName>style.visibility</p:attrName>
+                                        </p:attrNameLst>
+                                      </p:cBhvr>
+                                      <p:to>
+                                        <p:strVal val="hidden"/>
+                                      </p:to>
+                                    </p:set>
+                                  </p:childTnLst>
+                                </p:cTn>
+                              </p:par>
+                              <p:par>
+                                <p:cTn id="29" presetID="3" presetClass="exit" presetSubtype="10" fill="hold" grpId="1" nodeType="withEffect">
+                                  <p:stCondLst>
+                                    <p:cond delay="0"/>
+                                  </p:stCondLst>
+                                  <p:childTnLst>
+                                    <p:animEffect transition="out" filter="blinds(horizontal)">
+                                      <p:cBhvr>
+                                        <p:cTn id="30" dur="500"/>
+                                        <p:tgtEl>
+                                          <p:spTgt spid="10"/>
+                                        </p:tgtEl>
+                                      </p:cBhvr>
+                                    </p:animEffect>
+                                    <p:set>
+                                      <p:cBhvr>
+                                        <p:cTn id="31" dur="1" fill="hold">
+                                          <p:stCondLst>
+                                            <p:cond delay="499"/>
+                                          </p:stCondLst>
+                                        </p:cTn>
+                                        <p:tgtEl>
+                                          <p:spTgt spid="10"/>
+                                        </p:tgtEl>
+                                        <p:attrNameLst>
+                                          <p:attrName>style.visibility</p:attrName>
+                                        </p:attrNameLst>
+                                      </p:cBhvr>
+                                      <p:to>
+                                        <p:strVal val="hidden"/>
+                                      </p:to>
+                                    </p:set>
+                                  </p:childTnLst>
+                                </p:cTn>
+                              </p:par>
+                            </p:childTnLst>
+                          </p:cTn>
+                        </p:par>
+                      </p:childTnLst>
+                    </p:cTn>
+                  </p:par>
+                  <p:par>
+                    <p:cTn id="32" fill="hold">
+                      <p:stCondLst>
+                        <p:cond delay="indefinite"/>
+                      </p:stCondLst>
+                      <p:childTnLst>
+                        <p:par>
+                          <p:cTn id="33" fill="hold">
+                            <p:stCondLst>
+                              <p:cond delay="0"/>
+                            </p:stCondLst>
+                            <p:childTnLst>
+                              <p:par>
+                                <p:cTn id="34" presetID="3" presetClass="entr" presetSubtype="10" fill="hold" grpId="0" nodeType="clickEffect">
+                                  <p:stCondLst>
+                                    <p:cond delay="0"/>
+                                  </p:stCondLst>
+                                  <p:childTnLst>
+                                    <p:set>
+                                      <p:cBhvr>
+                                        <p:cTn id="35" dur="1" fill="hold">
+                                          <p:stCondLst>
+                                            <p:cond delay="0"/>
+                                          </p:stCondLst>
+                                        </p:cTn>
+                                        <p:tgtEl>
+                                          <p:spTgt spid="12"/>
+                                        </p:tgtEl>
+                                        <p:attrNameLst>
+                                          <p:attrName>style.visibility</p:attrName>
+                                        </p:attrNameLst>
+                                      </p:cBhvr>
+                                      <p:to>
+                                        <p:strVal val="visible"/>
+                                      </p:to>
+                                    </p:set>
+                                    <p:animEffect transition="in" filter="blinds(horizontal)">
+                                      <p:cBhvr>
+                                        <p:cTn id="36" dur="500"/>
+                                        <p:tgtEl>
+                                          <p:spTgt spid="12"/>
+                                        </p:tgtEl>
+                                      </p:cBhvr>
+                                    </p:animEffect>
+                                  </p:childTnLst>
+                                </p:cTn>
+                              </p:par>
+                              <p:par>
+                                <p:cTn id="37" presetID="3" presetClass="entr" presetSubtype="10" fill="hold" grpId="0" nodeType="withEffect">
+                                  <p:stCondLst>
+                                    <p:cond delay="0"/>
+                                  </p:stCondLst>
+                                  <p:childTnLst>
+                                    <p:set>
+                                      <p:cBhvr>
+                                        <p:cTn id="38" dur="1" fill="hold">
+                                          <p:stCondLst>
+                                            <p:cond delay="0"/>
+                                          </p:stCondLst>
+                                        </p:cTn>
+                                        <p:tgtEl>
+                                          <p:spTgt spid="13"/>
+                                        </p:tgtEl>
+                                        <p:attrNameLst>
+                                          <p:attrName>style.visibility</p:attrName>
+                                        </p:attrNameLst>
+                                      </p:cBhvr>
+                                      <p:to>
+                                        <p:strVal val="visible"/>
+                                      </p:to>
+                                    </p:set>
+                                    <p:animEffect transition="in" filter="blinds(horizontal)">
+                                      <p:cBhvr>
+                                        <p:cTn id="39" dur="500"/>
+                                        <p:tgtEl>
+                                          <p:spTgt spid="13"/>
+                                        </p:tgtEl>
+                                      </p:cBhvr>
+                                    </p:animEffect>
+                                  </p:childTnLst>
+                                </p:cTn>
+                              </p:par>
+                              <p:par>
+                                <p:cTn id="40" presetID="3" presetClass="entr" presetSubtype="10" fill="hold" nodeType="withEffect">
+                                  <p:stCondLst>
+                                    <p:cond delay="0"/>
+                                  </p:stCondLst>
+                                  <p:childTnLst>
+                                    <p:set>
+                                      <p:cBhvr>
+                                        <p:cTn id="41" dur="1" fill="hold">
+                                          <p:stCondLst>
+                                            <p:cond delay="0"/>
+                                          </p:stCondLst>
+                                        </p:cTn>
+                                        <p:tgtEl>
+                                          <p:spTgt spid="1029"/>
+                                        </p:tgtEl>
+                                        <p:attrNameLst>
+                                          <p:attrName>style.visibility</p:attrName>
+                                        </p:attrNameLst>
+                                      </p:cBhvr>
+                                      <p:to>
+                                        <p:strVal val="visible"/>
+                                      </p:to>
+                                    </p:set>
+                                    <p:animEffect transition="in" filter="blinds(horizontal)">
+                                      <p:cBhvr>
+                                        <p:cTn id="42" dur="500"/>
+                                        <p:tgtEl>
+                                          <p:spTgt spid="1029"/>
+                                        </p:tgtEl>
+                                      </p:cBhvr>
+                                    </p:animEffect>
+                                  </p:childTnLst>
+                                </p:cTn>
+                              </p:par>
+                            </p:childTnLst>
+                          </p:cTn>
+                        </p:par>
+                      </p:childTnLst>
+                    </p:cTn>
+                  </p:par>
+                  <p:par>
+                    <p:cTn id="43" fill="hold">
+                      <p:stCondLst>
+                        <p:cond delay="indefinite"/>
+                      </p:stCondLst>
+                      <p:childTnLst>
+                        <p:par>
+                          <p:cTn id="44" fill="hold">
+                            <p:stCondLst>
+                              <p:cond delay="0"/>
+                            </p:stCondLst>
+                            <p:childTnLst>
+                              <p:par>
+                                <p:cTn id="45" presetID="3" presetClass="exit" presetSubtype="10" fill="hold" grpId="1" nodeType="clickEffect">
+                                  <p:stCondLst>
+                                    <p:cond delay="0"/>
+                                  </p:stCondLst>
+                                  <p:childTnLst>
+                                    <p:animEffect transition="out" filter="blinds(horizontal)">
+                                      <p:cBhvr>
+                                        <p:cTn id="46" dur="500"/>
+                                        <p:tgtEl>
+                                          <p:spTgt spid="12"/>
+                                        </p:tgtEl>
+                                      </p:cBhvr>
+                                    </p:animEffect>
+                                    <p:set>
+                                      <p:cBhvr>
+                                        <p:cTn id="47" dur="1" fill="hold">
+                                          <p:stCondLst>
+                                            <p:cond delay="499"/>
+                                          </p:stCondLst>
+                                        </p:cTn>
+                                        <p:tgtEl>
+                                          <p:spTgt spid="12"/>
+                                        </p:tgtEl>
+                                        <p:attrNameLst>
+                                          <p:attrName>style.visibility</p:attrName>
+                                        </p:attrNameLst>
+                                      </p:cBhvr>
+                                      <p:to>
+                                        <p:strVal val="hidden"/>
+                                      </p:to>
+                                    </p:set>
+                                  </p:childTnLst>
+                                </p:cTn>
+                              </p:par>
+                              <p:par>
+                                <p:cTn id="48" presetID="3" presetClass="exit" presetSubtype="10" fill="hold" grpId="1" nodeType="withEffect">
+                                  <p:stCondLst>
+                                    <p:cond delay="0"/>
+                                  </p:stCondLst>
+                                  <p:childTnLst>
+                                    <p:animEffect transition="out" filter="blinds(horizontal)">
+                                      <p:cBhvr>
+                                        <p:cTn id="49" dur="500"/>
+                                        <p:tgtEl>
+                                          <p:spTgt spid="13"/>
+                                        </p:tgtEl>
+                                      </p:cBhvr>
+                                    </p:animEffect>
+                                    <p:set>
+                                      <p:cBhvr>
+                                        <p:cTn id="50" dur="1" fill="hold">
+                                          <p:stCondLst>
+                                            <p:cond delay="499"/>
+                                          </p:stCondLst>
+                                        </p:cTn>
+                                        <p:tgtEl>
+                                          <p:spTgt spid="13"/>
+                                        </p:tgtEl>
+                                        <p:attrNameLst>
+                                          <p:attrName>style.visibility</p:attrName>
+                                        </p:attrNameLst>
+                                      </p:cBhvr>
+                                      <p:to>
+                                        <p:strVal val="hidden"/>
+                                      </p:to>
+                                    </p:set>
+                                  </p:childTnLst>
+                                </p:cTn>
+                              </p:par>
+                            </p:childTnLst>
+                          </p:cTn>
+                        </p:par>
+                      </p:childTnLst>
+                    </p:cTn>
+                  </p:par>
+                  <p:par>
+                    <p:cTn id="51" fill="hold">
+                      <p:stCondLst>
+                        <p:cond delay="indefinite"/>
+                      </p:stCondLst>
+                      <p:childTnLst>
+                        <p:par>
+                          <p:cTn id="52" fill="hold">
+                            <p:stCondLst>
+                              <p:cond delay="0"/>
+                            </p:stCondLst>
+                            <p:childTnLst>
+                              <p:par>
+                                <p:cTn id="53" presetID="3" presetClass="entr" presetSubtype="10" fill="hold" grpId="0" nodeType="clickEffect">
+                                  <p:stCondLst>
+                                    <p:cond delay="0"/>
+                                  </p:stCondLst>
+                                  <p:childTnLst>
+                                    <p:set>
+                                      <p:cBhvr>
+                                        <p:cTn id="54" dur="1" fill="hold">
+                                          <p:stCondLst>
+                                            <p:cond delay="0"/>
+                                          </p:stCondLst>
+                                        </p:cTn>
+                                        <p:tgtEl>
+                                          <p:spTgt spid="14"/>
+                                        </p:tgtEl>
+                                        <p:attrNameLst>
+                                          <p:attrName>style.visibility</p:attrName>
+                                        </p:attrNameLst>
+                                      </p:cBhvr>
+                                      <p:to>
+                                        <p:strVal val="visible"/>
+                                      </p:to>
+                                    </p:set>
+                                    <p:animEffect transition="in" filter="blinds(horizontal)">
+                                      <p:cBhvr>
+                                        <p:cTn id="55" dur="500"/>
+                                        <p:tgtEl>
+                                          <p:spTgt spid="14"/>
+                                        </p:tgtEl>
+                                      </p:cBhvr>
+                                    </p:animEffect>
+                                  </p:childTnLst>
+                                </p:cTn>
+                              </p:par>
+                              <p:par>
+                                <p:cTn id="56" presetID="3" presetClass="entr" presetSubtype="10" fill="hold" grpId="0" nodeType="withEffect">
+                                  <p:stCondLst>
+                                    <p:cond delay="0"/>
+                                  </p:stCondLst>
+                                  <p:childTnLst>
+                                    <p:set>
+                                      <p:cBhvr>
+                                        <p:cTn id="57" dur="1" fill="hold">
+                                          <p:stCondLst>
+                                            <p:cond delay="0"/>
+                                          </p:stCondLst>
+                                        </p:cTn>
+                                        <p:tgtEl>
+                                          <p:spTgt spid="16"/>
+                                        </p:tgtEl>
+                                        <p:attrNameLst>
+                                          <p:attrName>style.visibility</p:attrName>
+                                        </p:attrNameLst>
+                                      </p:cBhvr>
+                                      <p:to>
+                                        <p:strVal val="visible"/>
+                                      </p:to>
+                                    </p:set>
+                                    <p:animEffect transition="in" filter="blinds(horizontal)">
+                                      <p:cBhvr>
+                                        <p:cTn id="58" dur="500"/>
+                                        <p:tgtEl>
+                                          <p:spTgt spid="16"/>
+                                        </p:tgtEl>
+                                      </p:cBhvr>
+                                    </p:animEffect>
+                                  </p:childTnLst>
+                                </p:cTn>
+                              </p:par>
+                              <p:par>
+                                <p:cTn id="59" presetID="3" presetClass="entr" presetSubtype="10" fill="hold" nodeType="withEffect">
+                                  <p:stCondLst>
+                                    <p:cond delay="0"/>
+                                  </p:stCondLst>
+                                  <p:childTnLst>
+                                    <p:set>
+                                      <p:cBhvr>
+                                        <p:cTn id="60" dur="1" fill="hold">
+                                          <p:stCondLst>
+                                            <p:cond delay="0"/>
+                                          </p:stCondLst>
+                                        </p:cTn>
+                                        <p:tgtEl>
+                                          <p:spTgt spid="1030"/>
+                                        </p:tgtEl>
+                                        <p:attrNameLst>
+                                          <p:attrName>style.visibility</p:attrName>
+                                        </p:attrNameLst>
+                                      </p:cBhvr>
+                                      <p:to>
+                                        <p:strVal val="visible"/>
+                                      </p:to>
+                                    </p:set>
+                                    <p:animEffect transition="in" filter="blinds(horizontal)">
+                                      <p:cBhvr>
+                                        <p:cTn id="61" dur="500"/>
+                                        <p:tgtEl>
+                                          <p:spTgt spid="1030"/>
+                                        </p:tgtEl>
+                                      </p:cBhvr>
+                                    </p:animEffect>
+                                  </p:childTnLst>
+                                </p:cTn>
+                              </p:par>
+                              <p:par>
+                                <p:cTn id="62" presetID="3" presetClass="entr" presetSubtype="10" fill="hold" grpId="0" nodeType="withEffect">
+                                  <p:stCondLst>
+                                    <p:cond delay="0"/>
+                                  </p:stCondLst>
+                                  <p:childTnLst>
+                                    <p:set>
+                                      <p:cBhvr>
+                                        <p:cTn id="63" dur="1" fill="hold">
+                                          <p:stCondLst>
+                                            <p:cond delay="0"/>
+                                          </p:stCondLst>
+                                        </p:cTn>
+                                        <p:tgtEl>
+                                          <p:spTgt spid="15"/>
+                                        </p:tgtEl>
+                                        <p:attrNameLst>
+                                          <p:attrName>style.visibility</p:attrName>
+                                        </p:attrNameLst>
+                                      </p:cBhvr>
+                                      <p:to>
+                                        <p:strVal val="visible"/>
+                                      </p:to>
+                                    </p:set>
+                                    <p:animEffect transition="in" filter="blinds(horizontal)">
+                                      <p:cBhvr>
+                                        <p:cTn id="64" dur="500"/>
+                                        <p:tgtEl>
+                                          <p:spTgt spid="15"/>
+                                        </p:tgtEl>
+                                      </p:cBhvr>
+                                    </p:animEffect>
+                                  </p:childTnLst>
+                                </p:cTn>
+                              </p:par>
+                              <p:par>
+                                <p:cTn id="65" presetID="3" presetClass="entr" presetSubtype="10" fill="hold" nodeType="withEffect">
+                                  <p:stCondLst>
+                                    <p:cond delay="0"/>
+                                  </p:stCondLst>
+                                  <p:childTnLst>
+                                    <p:set>
+                                      <p:cBhvr>
+                                        <p:cTn id="66" dur="1" fill="hold">
+                                          <p:stCondLst>
+                                            <p:cond delay="0"/>
+                                          </p:stCondLst>
+                                        </p:cTn>
+                                        <p:tgtEl>
+                                          <p:spTgt spid="1031"/>
+                                        </p:tgtEl>
+                                        <p:attrNameLst>
+                                          <p:attrName>style.visibility</p:attrName>
+                                        </p:attrNameLst>
+                                      </p:cBhvr>
+                                      <p:to>
+                                        <p:strVal val="visible"/>
+                                      </p:to>
+                                    </p:set>
+                                    <p:animEffect transition="in" filter="blinds(horizontal)">
+                                      <p:cBhvr>
+                                        <p:cTn id="67" dur="500"/>
+                                        <p:tgtEl>
+                                          <p:spTgt spid="1031"/>
+                                        </p:tgtEl>
+                                      </p:cBhvr>
+                                    </p:animEffect>
+                                  </p:childTnLst>
+                                </p:cTn>
+                              </p:par>
+                              <p:par>
+                                <p:cTn id="68" presetID="3" presetClass="entr" presetSubtype="10" fill="hold" grpId="0" nodeType="withEffect">
+                                  <p:stCondLst>
+                                    <p:cond delay="0"/>
+                                  </p:stCondLst>
+                                  <p:childTnLst>
+                                    <p:set>
+                                      <p:cBhvr>
+                                        <p:cTn id="69" dur="1" fill="hold">
+                                          <p:stCondLst>
+                                            <p:cond delay="0"/>
+                                          </p:stCondLst>
+                                        </p:cTn>
+                                        <p:tgtEl>
+                                          <p:spTgt spid="17"/>
+                                        </p:tgtEl>
+                                        <p:attrNameLst>
+                                          <p:attrName>style.visibility</p:attrName>
+                                        </p:attrNameLst>
+                                      </p:cBhvr>
+                                      <p:to>
+                                        <p:strVal val="visible"/>
+                                      </p:to>
+                                    </p:set>
+                                    <p:animEffect transition="in" filter="blinds(horizontal)">
+                                      <p:cBhvr>
+                                        <p:cTn id="70" dur="500"/>
+                                        <p:tgtEl>
+                                          <p:spTgt spid="17"/>
+                                        </p:tgtEl>
+                                      </p:cBhvr>
+                                    </p:animEffect>
+                                  </p:childTnLst>
+                                </p:cTn>
+                              </p:par>
+                            </p:childTnLst>
+                          </p:cTn>
+                        </p:par>
+                      </p:childTnLst>
+                    </p:cTn>
+                  </p:par>
+                </p:childTnLst>
+              </p:cTn>
+              <p:prevCondLst>
+                <p:cond evt="onPrev" delay="0">
+                  <p:tgtEl>
+                    <p:sldTgt/>
+                  </p:tgtEl>
+                </p:cond>
+              </p:prevCondLst>
+              <p:nextCondLst>
+                <p:cond evt="onNext" delay="0">
+                  <p:tgtEl>
+                    <p:sldTgt/>
+                  </p:tgtEl>
+                </p:cond>
+              </p:nextCondLst>
+            </p:seq>
+          </p:childTnLst>
+        </p:cTn>
+      </p:par>
+    </p:tnLst>
+    <p:bldLst>
+      <p:bldP spid="10" grpId="0" animBg="1"/>
+      <p:bldP spid="10" grpId="1" animBg="1"/>
+      <p:bldP spid="11" grpId="0" animBg="1"/>
+      <p:bldP spid="11" grpId="1" animBg="1"/>
+      <p:bldP spid="12" grpId="0" animBg="1"/>
+      <p:bldP spid="12" grpId="1" animBg="1"/>
+      <p:bldP spid="13" grpId="0" animBg="1"/>
+      <p:bldP spid="13" grpId="1" animBg="1"/>
+      <p:bldP spid="14" grpId="0" animBg="1"/>
+      <p:bldP spid="15" grpId="0" animBg="1"/>
+      <p:bldP spid="16" grpId="0" animBg="1"/>
+      <p:bldP spid="17" grpId="0" animBg="1"/>
+    </p:bldLst>
+  </p:timing>
+</p:sld>
+</file>
+
+<file path=ppt/slides/slide12.xml><?xml version="1.0" encoding="utf-8"?>
+<p:sld xmlns:a="http://schemas.openxmlformats.org/drawingml/2006/main" xmlns:r="http://schemas.openxmlformats.org/officeDocument/2006/relationships" xmlns:p="http://schemas.openxmlformats.org/presentationml/2006/main">
+  <p:cSld>
+    <p:spTree>
+      <p:nvGrpSpPr>
+        <p:cNvPr id="1" name=""/>
+        <p:cNvGrpSpPr/>
+        <p:nvPr/>
+      </p:nvGrpSpPr>
+      <p:grpSpPr>
+        <a:xfrm>
+          <a:off x="0" y="0"/>
+          <a:ext cx="0" cy="0"/>
+          <a:chOff x="0" y="0"/>
+          <a:chExt cx="0" cy="0"/>
+        </a:xfrm>
+      </p:grpSpPr>
+      <p:sp>
+        <p:nvSpPr>
+          <p:cNvPr id="2" name="Title 1"/>
+          <p:cNvSpPr>
+            <a:spLocks noGrp="1"/>
+          </p:cNvSpPr>
+          <p:nvPr>
+            <p:ph type="ctrTitle"/>
+          </p:nvPr>
+        </p:nvSpPr>
+        <p:spPr>
+          <a:xfrm>
+            <a:off x="714348" y="357166"/>
+            <a:ext cx="7772400" cy="1470025"/>
+          </a:xfrm>
+        </p:spPr>
+        <p:txBody>
+          <a:bodyPr/>
+          <a:lstStyle/>
+          <a:p>
+            <a:r>
+              <a:rPr lang="en-US" dirty="0" smtClean="0"/>
+              <a:t>Schedule</a:t>
+            </a:r>
+            <a:endParaRPr lang="he-IL" dirty="0"/>
+          </a:p>
+        </p:txBody>
+      </p:sp>
+      <p:sp>
+        <p:nvSpPr>
+          <p:cNvPr id="3" name="Subtitle 2"/>
+          <p:cNvSpPr>
+            <a:spLocks noGrp="1"/>
+          </p:cNvSpPr>
+          <p:nvPr>
+            <p:ph type="subTitle" idx="1"/>
+          </p:nvPr>
+        </p:nvSpPr>
+        <p:spPr>
+          <a:xfrm>
+            <a:off x="357158" y="1643050"/>
             <a:ext cx="8286808" cy="3214710"/>
           </a:xfrm>
         </p:spPr>
@@ -3790,7 +5295,7 @@
                   <a:schemeClr val="tx1"/>
                 </a:solidFill>
               </a:rPr>
-              <a:t>Master and Slave Host Connection </a:t>
+              <a:t>Master </a:t>
             </a:r>
             <a:r>
               <a:rPr lang="en-US" sz="2800" dirty="0" smtClean="0">
@@ -3798,7 +5303,7 @@
                   <a:schemeClr val="tx1"/>
                 </a:solidFill>
               </a:rPr>
-              <a:t>–</a:t>
+              <a:t>Host and </a:t>
             </a:r>
             <a:r>
               <a:rPr lang="en-US" sz="2800" dirty="0" smtClean="0">
@@ -3806,7 +5311,23 @@
                   <a:schemeClr val="tx1"/>
                 </a:solidFill>
               </a:rPr>
-              <a:t> 24.10.2011</a:t>
+              <a:t>Slave </a:t>
+            </a:r>
+            <a:r>
+              <a:rPr lang="en-US" sz="2800" dirty="0" smtClean="0">
+                <a:solidFill>
+                  <a:schemeClr val="tx1"/>
+                </a:solidFill>
+              </a:rPr>
+              <a:t>Connection </a:t>
+            </a:r>
+            <a:r>
+              <a:rPr lang="en-US" sz="2800" dirty="0" smtClean="0">
+                <a:solidFill>
+                  <a:schemeClr val="tx1"/>
+                </a:solidFill>
+              </a:rPr>
+              <a:t>– 24.10.2011</a:t>
             </a:r>
             <a:endParaRPr lang="en-US" sz="2800" dirty="0">
               <a:solidFill>
@@ -3834,6 +5355,670 @@
                 </a:solidFill>
               </a:rPr>
               <a:t>Verification schedule is unknown yet.</a:t>
+            </a:r>
+          </a:p>
+        </p:txBody>
+      </p:sp>
+    </p:spTree>
+  </p:cSld>
+  <p:clrMapOvr>
+    <a:masterClrMapping/>
+  </p:clrMapOvr>
+  <p:timing>
+    <p:tnLst>
+      <p:par>
+        <p:cTn id="1" dur="indefinite" restart="never" nodeType="tmRoot"/>
+      </p:par>
+    </p:tnLst>
+  </p:timing>
+</p:sld>
+</file>
+
+<file path=ppt/slides/slide13.xml><?xml version="1.0" encoding="utf-8"?>
+<p:sld xmlns:a="http://schemas.openxmlformats.org/drawingml/2006/main" xmlns:r="http://schemas.openxmlformats.org/officeDocument/2006/relationships" xmlns:p="http://schemas.openxmlformats.org/presentationml/2006/main">
+  <p:cSld>
+    <p:spTree>
+      <p:nvGrpSpPr>
+        <p:cNvPr id="1" name=""/>
+        <p:cNvGrpSpPr/>
+        <p:nvPr/>
+      </p:nvGrpSpPr>
+      <p:grpSpPr>
+        <a:xfrm>
+          <a:off x="0" y="0"/>
+          <a:ext cx="0" cy="0"/>
+          <a:chOff x="0" y="0"/>
+          <a:chExt cx="0" cy="0"/>
+        </a:xfrm>
+      </p:grpSpPr>
+      <p:sp>
+        <p:nvSpPr>
+          <p:cNvPr id="2" name="Title 1"/>
+          <p:cNvSpPr>
+            <a:spLocks noGrp="1"/>
+          </p:cNvSpPr>
+          <p:nvPr>
+            <p:ph type="ctrTitle"/>
+          </p:nvPr>
+        </p:nvSpPr>
+        <p:spPr>
+          <a:xfrm>
+            <a:off x="714348" y="357166"/>
+            <a:ext cx="7772400" cy="1470025"/>
+          </a:xfrm>
+        </p:spPr>
+        <p:txBody>
+          <a:bodyPr/>
+          <a:lstStyle/>
+          <a:p>
+            <a:pPr rtl="0"/>
+            <a:r>
+              <a:rPr lang="en-US" dirty="0" smtClean="0"/>
+              <a:t>Verification Plan (1)</a:t>
+            </a:r>
+            <a:endParaRPr lang="he-IL" dirty="0"/>
+          </a:p>
+        </p:txBody>
+      </p:sp>
+      <p:sp>
+        <p:nvSpPr>
+          <p:cNvPr id="3" name="Subtitle 2"/>
+          <p:cNvSpPr>
+            <a:spLocks noGrp="1"/>
+          </p:cNvSpPr>
+          <p:nvPr>
+            <p:ph type="subTitle" idx="1"/>
+          </p:nvPr>
+        </p:nvSpPr>
+        <p:spPr>
+          <a:xfrm>
+            <a:off x="357158" y="1643050"/>
+            <a:ext cx="8286808" cy="4214842"/>
+          </a:xfrm>
+        </p:spPr>
+        <p:txBody>
+          <a:bodyPr>
+            <a:normAutofit lnSpcReduction="10000"/>
+          </a:bodyPr>
+          <a:lstStyle/>
+          <a:p>
+            <a:pPr marL="514350" indent="-514350" algn="l" rtl="0"/>
+            <a:r>
+              <a:rPr lang="en-US" sz="2800" dirty="0" smtClean="0">
+                <a:solidFill>
+                  <a:schemeClr val="tx1"/>
+                </a:solidFill>
+              </a:rPr>
+              <a:t>SPI Master:</a:t>
+            </a:r>
+          </a:p>
+          <a:p>
+            <a:pPr marL="971550" lvl="1" indent="-514350" algn="l" rtl="0">
+              <a:buFont typeface="+mj-lt"/>
+              <a:buAutoNum type="alphaLcPeriod"/>
+            </a:pPr>
+            <a:r>
+              <a:rPr lang="en-US" sz="2400" dirty="0" smtClean="0">
+                <a:solidFill>
+                  <a:schemeClr val="tx1"/>
+                </a:solidFill>
+              </a:rPr>
+              <a:t>Run with all 4 possible options of CPOL and CPHA.</a:t>
+            </a:r>
+          </a:p>
+          <a:p>
+            <a:pPr marL="971550" lvl="1" indent="-514350" algn="l" rtl="0">
+              <a:buFont typeface="+mj-lt"/>
+              <a:buAutoNum type="alphaLcPeriod"/>
+            </a:pPr>
+            <a:r>
+              <a:rPr lang="en-US" sz="2400" dirty="0" smtClean="0">
+                <a:solidFill>
+                  <a:schemeClr val="tx1"/>
+                </a:solidFill>
+              </a:rPr>
+              <a:t>Validate that clock is divided correct for minimum and maximum register value.</a:t>
+            </a:r>
+          </a:p>
+          <a:p>
+            <a:pPr marL="971550" lvl="1" indent="-514350" algn="l" rtl="0">
+              <a:buFont typeface="+mj-lt"/>
+              <a:buAutoNum type="alphaLcPeriod"/>
+            </a:pPr>
+            <a:r>
+              <a:rPr lang="en-US" sz="2400" dirty="0" smtClean="0">
+                <a:solidFill>
+                  <a:schemeClr val="tx1"/>
+                </a:solidFill>
+              </a:rPr>
+              <a:t>FIFO empty (should stop SPI Master transaction).</a:t>
+            </a:r>
+          </a:p>
+          <a:p>
+            <a:pPr marL="971550" lvl="1" indent="-514350" algn="l" rtl="0">
+              <a:buFont typeface="+mj-lt"/>
+              <a:buAutoNum type="alphaLcPeriod"/>
+            </a:pPr>
+            <a:r>
+              <a:rPr lang="en-US" sz="2400" dirty="0" smtClean="0">
+                <a:solidFill>
+                  <a:schemeClr val="tx1"/>
+                </a:solidFill>
+              </a:rPr>
+              <a:t>Register change during active transaction (Should cause error)</a:t>
+            </a:r>
+          </a:p>
+          <a:p>
+            <a:pPr marL="971550" lvl="1" indent="-514350" algn="l" rtl="0">
+              <a:buFont typeface="+mj-lt"/>
+              <a:buAutoNum type="alphaLcPeriod"/>
+            </a:pPr>
+            <a:r>
+              <a:rPr lang="en-US" sz="2400" dirty="0" smtClean="0">
+                <a:solidFill>
+                  <a:schemeClr val="tx1"/>
+                </a:solidFill>
+              </a:rPr>
+              <a:t>Operation with single / multiple slaves</a:t>
+            </a:r>
+          </a:p>
+          <a:p>
+            <a:pPr marL="971550" lvl="1" indent="-514350" algn="l" rtl="0">
+              <a:buFont typeface="+mj-lt"/>
+              <a:buAutoNum type="alphaLcPeriod"/>
+            </a:pPr>
+            <a:r>
+              <a:rPr lang="en-US" sz="2400" dirty="0" smtClean="0">
+                <a:solidFill>
+                  <a:schemeClr val="tx1"/>
+                </a:solidFill>
+              </a:rPr>
+              <a:t>During RESET, change inputs. Validate outputs are in their default value.</a:t>
+            </a:r>
+            <a:endParaRPr lang="en-US" sz="2400" dirty="0" smtClean="0">
+              <a:solidFill>
+                <a:schemeClr val="tx1"/>
+              </a:solidFill>
+            </a:endParaRPr>
+          </a:p>
+        </p:txBody>
+      </p:sp>
+    </p:spTree>
+  </p:cSld>
+  <p:clrMapOvr>
+    <a:masterClrMapping/>
+  </p:clrMapOvr>
+  <p:timing>
+    <p:tnLst>
+      <p:par>
+        <p:cTn id="1" dur="indefinite" restart="never" nodeType="tmRoot"/>
+      </p:par>
+    </p:tnLst>
+  </p:timing>
+</p:sld>
+</file>
+
+<file path=ppt/slides/slide14.xml><?xml version="1.0" encoding="utf-8"?>
+<p:sld xmlns:a="http://schemas.openxmlformats.org/drawingml/2006/main" xmlns:r="http://schemas.openxmlformats.org/officeDocument/2006/relationships" xmlns:p="http://schemas.openxmlformats.org/presentationml/2006/main">
+  <p:cSld>
+    <p:spTree>
+      <p:nvGrpSpPr>
+        <p:cNvPr id="1" name=""/>
+        <p:cNvGrpSpPr/>
+        <p:nvPr/>
+      </p:nvGrpSpPr>
+      <p:grpSpPr>
+        <a:xfrm>
+          <a:off x="0" y="0"/>
+          <a:ext cx="0" cy="0"/>
+          <a:chOff x="0" y="0"/>
+          <a:chExt cx="0" cy="0"/>
+        </a:xfrm>
+      </p:grpSpPr>
+      <p:sp>
+        <p:nvSpPr>
+          <p:cNvPr id="2" name="Title 1"/>
+          <p:cNvSpPr>
+            <a:spLocks noGrp="1"/>
+          </p:cNvSpPr>
+          <p:nvPr>
+            <p:ph type="ctrTitle"/>
+          </p:nvPr>
+        </p:nvSpPr>
+        <p:spPr>
+          <a:xfrm>
+            <a:off x="714348" y="357166"/>
+            <a:ext cx="7772400" cy="1470025"/>
+          </a:xfrm>
+        </p:spPr>
+        <p:txBody>
+          <a:bodyPr/>
+          <a:lstStyle/>
+          <a:p>
+            <a:pPr rtl="0"/>
+            <a:r>
+              <a:rPr lang="en-US" dirty="0" smtClean="0"/>
+              <a:t>Verification Plan (2)</a:t>
+            </a:r>
+            <a:endParaRPr lang="he-IL" dirty="0"/>
+          </a:p>
+        </p:txBody>
+      </p:sp>
+      <p:sp>
+        <p:nvSpPr>
+          <p:cNvPr id="3" name="Subtitle 2"/>
+          <p:cNvSpPr>
+            <a:spLocks noGrp="1"/>
+          </p:cNvSpPr>
+          <p:nvPr>
+            <p:ph type="subTitle" idx="1"/>
+          </p:nvPr>
+        </p:nvSpPr>
+        <p:spPr>
+          <a:xfrm>
+            <a:off x="357158" y="1643050"/>
+            <a:ext cx="8286808" cy="4214842"/>
+          </a:xfrm>
+        </p:spPr>
+        <p:txBody>
+          <a:bodyPr>
+            <a:normAutofit/>
+          </a:bodyPr>
+          <a:lstStyle/>
+          <a:p>
+            <a:pPr marL="514350" indent="-514350" algn="l" rtl="0"/>
+            <a:r>
+              <a:rPr lang="en-US" sz="2800" dirty="0" smtClean="0">
+                <a:solidFill>
+                  <a:schemeClr val="tx1"/>
+                </a:solidFill>
+              </a:rPr>
+              <a:t>SPI Slave:</a:t>
+            </a:r>
+          </a:p>
+          <a:p>
+            <a:pPr marL="971550" lvl="1" indent="-514350" algn="l" rtl="0">
+              <a:buFont typeface="+mj-lt"/>
+              <a:buAutoNum type="alphaLcPeriod"/>
+            </a:pPr>
+            <a:r>
+              <a:rPr lang="en-US" sz="2400" dirty="0" smtClean="0">
+                <a:solidFill>
+                  <a:schemeClr val="tx1"/>
+                </a:solidFill>
+              </a:rPr>
+              <a:t>Run with all 4 possible options of CPOL and CPHA.</a:t>
+            </a:r>
+          </a:p>
+          <a:p>
+            <a:pPr marL="971550" lvl="1" indent="-514350" algn="l" rtl="0">
+              <a:buFont typeface="+mj-lt"/>
+              <a:buAutoNum type="alphaLcPeriod"/>
+            </a:pPr>
+            <a:r>
+              <a:rPr lang="en-US" sz="2400" dirty="0" smtClean="0">
+                <a:solidFill>
+                  <a:schemeClr val="tx1"/>
+                </a:solidFill>
+              </a:rPr>
+              <a:t>Negate SPI_SS in the middle of the transaction.</a:t>
+            </a:r>
+          </a:p>
+          <a:p>
+            <a:pPr marL="971550" lvl="1" indent="-514350" algn="l" rtl="0">
+              <a:buFont typeface="+mj-lt"/>
+              <a:buAutoNum type="alphaLcPeriod"/>
+            </a:pPr>
+            <a:r>
+              <a:rPr lang="en-US" sz="2400" dirty="0" smtClean="0">
+                <a:solidFill>
+                  <a:schemeClr val="tx1"/>
+                </a:solidFill>
+              </a:rPr>
+              <a:t>SPI_CLK stops for a long time (time out).</a:t>
+            </a:r>
+            <a:endParaRPr lang="en-US" sz="2400" dirty="0" smtClean="0">
+              <a:solidFill>
+                <a:schemeClr val="tx1"/>
+              </a:solidFill>
+            </a:endParaRPr>
+          </a:p>
+          <a:p>
+            <a:pPr marL="971550" lvl="1" indent="-514350" algn="l" rtl="0">
+              <a:buFont typeface="+mj-lt"/>
+              <a:buAutoNum type="alphaLcPeriod"/>
+            </a:pPr>
+            <a:r>
+              <a:rPr lang="en-US" sz="2400" dirty="0" smtClean="0">
+                <a:solidFill>
+                  <a:schemeClr val="tx1"/>
+                </a:solidFill>
+              </a:rPr>
+              <a:t>Data from RAM is not valid when it should be.</a:t>
+            </a:r>
+          </a:p>
+          <a:p>
+            <a:pPr marL="971550" lvl="1" indent="-514350" algn="l" rtl="0">
+              <a:buFont typeface="+mj-lt"/>
+              <a:buAutoNum type="alphaLcPeriod"/>
+            </a:pPr>
+            <a:r>
+              <a:rPr lang="en-US" sz="2400" dirty="0" smtClean="0">
+                <a:solidFill>
+                  <a:schemeClr val="tx1"/>
+                </a:solidFill>
+              </a:rPr>
+              <a:t>Register change during active transaction (Should influence after transaction only)</a:t>
+            </a:r>
+          </a:p>
+          <a:p>
+            <a:pPr marL="971550" lvl="1" indent="-514350" algn="l" rtl="0">
+              <a:buFont typeface="+mj-lt"/>
+              <a:buAutoNum type="alphaLcPeriod"/>
+            </a:pPr>
+            <a:r>
+              <a:rPr lang="en-US" sz="2400" dirty="0" smtClean="0">
+                <a:solidFill>
+                  <a:schemeClr val="tx1"/>
+                </a:solidFill>
+              </a:rPr>
+              <a:t>During RESET, change inputs. Validate outputs are in their default </a:t>
+            </a:r>
+            <a:r>
+              <a:rPr lang="en-US" sz="2400" dirty="0" smtClean="0">
+                <a:solidFill>
+                  <a:schemeClr val="tx1"/>
+                </a:solidFill>
+              </a:rPr>
+              <a:t>value</a:t>
+            </a:r>
+            <a:r>
+              <a:rPr lang="en-US" sz="2400" dirty="0" smtClean="0">
+                <a:solidFill>
+                  <a:schemeClr val="tx1"/>
+                </a:solidFill>
+              </a:rPr>
+              <a:t>.</a:t>
+            </a:r>
+          </a:p>
+        </p:txBody>
+      </p:sp>
+    </p:spTree>
+  </p:cSld>
+  <p:clrMapOvr>
+    <a:masterClrMapping/>
+  </p:clrMapOvr>
+  <p:timing>
+    <p:tnLst>
+      <p:par>
+        <p:cTn id="1" dur="indefinite" restart="never" nodeType="tmRoot"/>
+      </p:par>
+    </p:tnLst>
+  </p:timing>
+</p:sld>
+</file>
+
+<file path=ppt/slides/slide15.xml><?xml version="1.0" encoding="utf-8"?>
+<p:sld xmlns:a="http://schemas.openxmlformats.org/drawingml/2006/main" xmlns:r="http://schemas.openxmlformats.org/officeDocument/2006/relationships" xmlns:p="http://schemas.openxmlformats.org/presentationml/2006/main">
+  <p:cSld>
+    <p:spTree>
+      <p:nvGrpSpPr>
+        <p:cNvPr id="1" name=""/>
+        <p:cNvGrpSpPr/>
+        <p:nvPr/>
+      </p:nvGrpSpPr>
+      <p:grpSpPr>
+        <a:xfrm>
+          <a:off x="0" y="0"/>
+          <a:ext cx="0" cy="0"/>
+          <a:chOff x="0" y="0"/>
+          <a:chExt cx="0" cy="0"/>
+        </a:xfrm>
+      </p:grpSpPr>
+      <p:sp>
+        <p:nvSpPr>
+          <p:cNvPr id="2" name="Title 1"/>
+          <p:cNvSpPr>
+            <a:spLocks noGrp="1"/>
+          </p:cNvSpPr>
+          <p:nvPr>
+            <p:ph type="ctrTitle"/>
+          </p:nvPr>
+        </p:nvSpPr>
+        <p:spPr>
+          <a:xfrm>
+            <a:off x="714348" y="357166"/>
+            <a:ext cx="7772400" cy="1470025"/>
+          </a:xfrm>
+        </p:spPr>
+        <p:txBody>
+          <a:bodyPr/>
+          <a:lstStyle/>
+          <a:p>
+            <a:pPr rtl="0"/>
+            <a:r>
+              <a:rPr lang="en-US" dirty="0" smtClean="0"/>
+              <a:t>Verification Plan (3)</a:t>
+            </a:r>
+            <a:endParaRPr lang="he-IL" dirty="0"/>
+          </a:p>
+        </p:txBody>
+      </p:sp>
+      <p:sp>
+        <p:nvSpPr>
+          <p:cNvPr id="3" name="Subtitle 2"/>
+          <p:cNvSpPr>
+            <a:spLocks noGrp="1"/>
+          </p:cNvSpPr>
+          <p:nvPr>
+            <p:ph type="subTitle" idx="1"/>
+          </p:nvPr>
+        </p:nvSpPr>
+        <p:spPr>
+          <a:xfrm>
+            <a:off x="357158" y="1643050"/>
+            <a:ext cx="8286808" cy="4786346"/>
+          </a:xfrm>
+        </p:spPr>
+        <p:txBody>
+          <a:bodyPr>
+            <a:normAutofit fontScale="92500" lnSpcReduction="10000"/>
+          </a:bodyPr>
+          <a:lstStyle/>
+          <a:p>
+            <a:pPr marL="514350" indent="-514350" algn="l" rtl="0"/>
+            <a:r>
+              <a:rPr lang="en-US" sz="2800" dirty="0" smtClean="0">
+                <a:solidFill>
+                  <a:schemeClr val="tx1"/>
+                </a:solidFill>
+              </a:rPr>
+              <a:t>Top Test Bench:</a:t>
+            </a:r>
+          </a:p>
+          <a:p>
+            <a:pPr marL="971550" lvl="1" indent="-514350" algn="l" rtl="0">
+              <a:buFont typeface="+mj-lt"/>
+              <a:buAutoNum type="alphaLcPeriod"/>
+            </a:pPr>
+            <a:r>
+              <a:rPr lang="en-US" sz="2400" dirty="0" smtClean="0">
+                <a:solidFill>
+                  <a:schemeClr val="tx1"/>
+                </a:solidFill>
+              </a:rPr>
+              <a:t>Run with all 4 possible options of CPOL and CPHA.</a:t>
+            </a:r>
+          </a:p>
+          <a:p>
+            <a:pPr marL="971550" lvl="1" indent="-514350" algn="l" rtl="0">
+              <a:buFont typeface="+mj-lt"/>
+              <a:buAutoNum type="alphaLcPeriod"/>
+            </a:pPr>
+            <a:r>
+              <a:rPr lang="en-US" sz="2400" dirty="0" smtClean="0">
+                <a:solidFill>
+                  <a:schemeClr val="tx1"/>
+                </a:solidFill>
+              </a:rPr>
+              <a:t>Run with </a:t>
+            </a:r>
+            <a:r>
+              <a:rPr lang="en-US" sz="2400" dirty="0" smtClean="0">
+                <a:solidFill>
+                  <a:schemeClr val="tx1"/>
+                </a:solidFill>
+              </a:rPr>
+              <a:t>different SPI_CLK frequencies.</a:t>
+            </a:r>
+          </a:p>
+          <a:p>
+            <a:pPr marL="971550" lvl="1" indent="-514350" algn="l" rtl="0">
+              <a:buFont typeface="+mj-lt"/>
+              <a:buAutoNum type="alphaLcPeriod"/>
+            </a:pPr>
+            <a:r>
+              <a:rPr lang="en-US" sz="2400" dirty="0" smtClean="0">
+                <a:solidFill>
+                  <a:schemeClr val="tx1"/>
+                </a:solidFill>
+              </a:rPr>
+              <a:t>Write data to random address in RAM, then read from it. Validate data match.</a:t>
+            </a:r>
+          </a:p>
+          <a:p>
+            <a:pPr marL="971550" lvl="1" indent="-514350" algn="l" rtl="0">
+              <a:buFont typeface="+mj-lt"/>
+              <a:buAutoNum type="alphaLcPeriod"/>
+            </a:pPr>
+            <a:r>
+              <a:rPr lang="en-US" sz="2400" dirty="0" smtClean="0">
+                <a:solidFill>
+                  <a:schemeClr val="tx1"/>
+                </a:solidFill>
+              </a:rPr>
+              <a:t>Perform “Write-write-read-write-read”.</a:t>
+            </a:r>
+          </a:p>
+          <a:p>
+            <a:pPr marL="971550" lvl="1" indent="-514350" algn="l" rtl="0">
+              <a:buFont typeface="+mj-lt"/>
+              <a:buAutoNum type="alphaLcPeriod"/>
+            </a:pPr>
+            <a:r>
+              <a:rPr lang="en-US" sz="2400" dirty="0" smtClean="0">
+                <a:solidFill>
+                  <a:schemeClr val="tx1"/>
+                </a:solidFill>
+              </a:rPr>
+              <a:t>Perform “Write-read-read-write-read”.</a:t>
+            </a:r>
+          </a:p>
+          <a:p>
+            <a:pPr marL="971550" lvl="1" indent="-514350" algn="l" rtl="0">
+              <a:buFont typeface="+mj-lt"/>
+              <a:buAutoNum type="alphaLcPeriod"/>
+            </a:pPr>
+            <a:r>
+              <a:rPr lang="en-US" sz="2400" dirty="0" smtClean="0">
+                <a:solidFill>
+                  <a:schemeClr val="tx1"/>
+                </a:solidFill>
+              </a:rPr>
+              <a:t>Write Single (burst size of 1), and Burst.</a:t>
+            </a:r>
+          </a:p>
+          <a:p>
+            <a:pPr marL="971550" lvl="1" indent="-514350" algn="l" rtl="0">
+              <a:buFont typeface="+mj-lt"/>
+              <a:buAutoNum type="alphaLcPeriod"/>
+            </a:pPr>
+            <a:r>
+              <a:rPr lang="en-US" sz="2400" dirty="0" smtClean="0">
+                <a:solidFill>
+                  <a:schemeClr val="tx1"/>
+                </a:solidFill>
+              </a:rPr>
+              <a:t>Write / </a:t>
+            </a:r>
+            <a:r>
+              <a:rPr lang="en-US" sz="2400" dirty="0" smtClean="0">
+                <a:solidFill>
+                  <a:srgbClr val="7030A0"/>
+                </a:solidFill>
+              </a:rPr>
+              <a:t>read</a:t>
+            </a:r>
+            <a:r>
+              <a:rPr lang="en-US" sz="2400" dirty="0" smtClean="0">
+                <a:solidFill>
+                  <a:schemeClr val="tx1"/>
+                </a:solidFill>
+              </a:rPr>
+              <a:t> to / </a:t>
+            </a:r>
+            <a:r>
+              <a:rPr lang="en-US" sz="2400" dirty="0" smtClean="0">
+                <a:solidFill>
+                  <a:srgbClr val="7030A0"/>
+                </a:solidFill>
+              </a:rPr>
+              <a:t>from</a:t>
+            </a:r>
+            <a:r>
+              <a:rPr lang="en-US" sz="2400" dirty="0" smtClean="0">
+                <a:solidFill>
+                  <a:schemeClr val="tx1"/>
+                </a:solidFill>
+              </a:rPr>
+              <a:t> non-existing register address.</a:t>
+            </a:r>
+          </a:p>
+          <a:p>
+            <a:pPr marL="971550" lvl="1" indent="-514350" algn="l" rtl="0">
+              <a:buFont typeface="+mj-lt"/>
+              <a:buAutoNum type="alphaLcPeriod"/>
+            </a:pPr>
+            <a:r>
+              <a:rPr lang="en-US" sz="2400" dirty="0" smtClean="0">
+                <a:solidFill>
+                  <a:schemeClr val="tx1"/>
+                </a:solidFill>
+              </a:rPr>
+              <a:t>Write to valid address, but burst length exceeds from valid address.</a:t>
+            </a:r>
+            <a:endParaRPr lang="en-US" sz="2400" dirty="0" smtClean="0">
+              <a:solidFill>
+                <a:schemeClr val="tx1"/>
+              </a:solidFill>
+            </a:endParaRPr>
+          </a:p>
+          <a:p>
+            <a:pPr marL="971550" lvl="1" indent="-514350" algn="l" rtl="0">
+              <a:buFont typeface="+mj-lt"/>
+              <a:buAutoNum type="alphaLcPeriod"/>
+            </a:pPr>
+            <a:r>
+              <a:rPr lang="en-US" sz="2400" dirty="0" smtClean="0">
+                <a:solidFill>
+                  <a:schemeClr val="tx1"/>
+                </a:solidFill>
+              </a:rPr>
+              <a:t>Stop transaction in the middle (Negate WBM_CYC).</a:t>
+            </a:r>
+          </a:p>
+          <a:p>
+            <a:pPr marL="971550" lvl="1" indent="-514350" algn="l" rtl="0">
+              <a:buFont typeface="+mj-lt"/>
+              <a:buAutoNum type="alphaLcPeriod"/>
+            </a:pPr>
+            <a:r>
+              <a:rPr lang="en-US" sz="2400" dirty="0" smtClean="0">
+                <a:solidFill>
+                  <a:schemeClr val="tx1"/>
+                </a:solidFill>
+              </a:rPr>
+              <a:t>Perform RESET in the middle of the transaction.</a:t>
             </a:r>
           </a:p>
         </p:txBody>
@@ -4550,7 +6735,9 @@
           <p:nvPr/>
         </p:nvPicPr>
         <p:blipFill>
-          <a:blip r:embed="rId2"/>
+          <a:blip r:embed="rId2">
+            <a:lum bright="-45000" contrast="27000"/>
+          </a:blip>
           <a:srcRect/>
           <a:stretch>
             <a:fillRect/>
@@ -4654,19 +6841,101 @@
               <a:buAutoNum type="arabicPeriod"/>
             </a:pPr>
             <a:r>
+              <a:rPr lang="en-US" sz="2800" dirty="0" smtClean="0">
+                <a:solidFill>
+                  <a:schemeClr val="tx1"/>
+                </a:solidFill>
+              </a:rPr>
+              <a:t>Implement SPI Master and SPI Slave</a:t>
+            </a:r>
+          </a:p>
+          <a:p>
+            <a:pPr marL="514350" indent="-514350" algn="l" rtl="0">
+              <a:buFont typeface="+mj-lt"/>
+              <a:buAutoNum type="arabicPeriod"/>
+            </a:pPr>
+            <a:endParaRPr lang="en-US" sz="2800" dirty="0" smtClean="0">
+              <a:solidFill>
+                <a:schemeClr val="tx1"/>
+              </a:solidFill>
+            </a:endParaRPr>
+          </a:p>
+          <a:p>
+            <a:pPr marL="514350" indent="-514350" algn="l" rtl="0">
+              <a:buFont typeface="+mj-lt"/>
+              <a:buAutoNum type="arabicPeriod"/>
+            </a:pPr>
+            <a:r>
+              <a:rPr lang="en-US" sz="2800" dirty="0" smtClean="0">
+                <a:solidFill>
+                  <a:schemeClr val="tx1"/>
+                </a:solidFill>
+              </a:rPr>
+              <a:t>Implement SPI Master and Slave Hosts</a:t>
+            </a:r>
+          </a:p>
+          <a:p>
+            <a:pPr marL="514350" indent="-514350" algn="l" rtl="0">
+              <a:buFont typeface="+mj-lt"/>
+              <a:buAutoNum type="arabicPeriod"/>
+            </a:pPr>
+            <a:endParaRPr lang="en-US" sz="2800" dirty="0" smtClean="0">
+              <a:solidFill>
+                <a:schemeClr val="tx1"/>
+              </a:solidFill>
+            </a:endParaRPr>
+          </a:p>
+          <a:p>
+            <a:pPr marL="514350" indent="-514350" algn="l" rtl="0">
+              <a:buFont typeface="+mj-lt"/>
+              <a:buAutoNum type="arabicPeriod"/>
+            </a:pPr>
+            <a:r>
+              <a:rPr lang="en-US" sz="2800" dirty="0" smtClean="0">
+                <a:solidFill>
+                  <a:schemeClr val="tx1"/>
+                </a:solidFill>
+              </a:rPr>
+              <a:t>Build Test Benches in System </a:t>
+            </a:r>
+            <a:r>
+              <a:rPr lang="en-US" sz="2800" dirty="0" err="1" smtClean="0">
+                <a:solidFill>
+                  <a:schemeClr val="tx1"/>
+                </a:solidFill>
+              </a:rPr>
+              <a:t>Verilog</a:t>
+            </a:r>
+            <a:r>
+              <a:rPr lang="en-US" sz="2800" dirty="0" smtClean="0">
+                <a:solidFill>
+                  <a:schemeClr val="tx1"/>
+                </a:solidFill>
+              </a:rPr>
+              <a:t>:</a:t>
+            </a:r>
+          </a:p>
+          <a:p>
+            <a:pPr marL="971550" lvl="1" indent="-514350" algn="l" rtl="0">
+              <a:buFont typeface="+mj-lt"/>
+              <a:buAutoNum type="alphaUcPeriod"/>
+            </a:pPr>
+            <a:r>
               <a:rPr lang="en-US" sz="2400" dirty="0" smtClean="0">
                 <a:solidFill>
                   <a:schemeClr val="tx1"/>
                 </a:solidFill>
               </a:rPr>
-              <a:t>Implement SPI Master and SPI Slave</a:t>
-            </a:r>
-          </a:p>
-          <a:p>
-            <a:pPr marL="514350" indent="-514350" algn="l" rtl="0">
-              <a:buFont typeface="+mj-lt"/>
-              <a:buAutoNum type="arabicPeriod"/>
-            </a:pPr>
+              <a:t>Individual TB for SPI Master and </a:t>
+            </a:r>
+            <a:r>
+              <a:rPr lang="en-US" sz="2400" dirty="0" smtClean="0">
+                <a:solidFill>
+                  <a:schemeClr val="tx1"/>
+                </a:solidFill>
+              </a:rPr>
+              <a:t>SPI Slave</a:t>
+            </a:r>
             <a:endParaRPr lang="en-US" sz="2400" dirty="0" smtClean="0">
               <a:solidFill>
                 <a:schemeClr val="tx1"/>
@@ -4674,9 +6943,9 @@
             </a:endParaRPr>
           </a:p>
           <a:p>
-            <a:pPr marL="514350" indent="-514350" algn="l" rtl="0">
+            <a:pPr marL="971550" lvl="1" indent="-514350" algn="l" rtl="0">
               <a:buFont typeface="+mj-lt"/>
-              <a:buAutoNum type="arabicPeriod"/>
+              <a:buAutoNum type="alphaUcPeriod"/>
             </a:pPr>
             <a:r>
               <a:rPr lang="en-US" sz="2400" dirty="0" smtClean="0">
@@ -4684,78 +6953,9 @@
                   <a:schemeClr val="tx1"/>
                 </a:solidFill>
               </a:rPr>
-              <a:t>Implement SPI Master and Slave Hosts</a:t>
-            </a:r>
-          </a:p>
-          <a:p>
-            <a:pPr marL="514350" indent="-514350" algn="l" rtl="0">
-              <a:buFont typeface="+mj-lt"/>
-              <a:buAutoNum type="arabicPeriod"/>
-            </a:pPr>
-            <a:endParaRPr lang="en-US" sz="2400" dirty="0" smtClean="0">
-              <a:solidFill>
-                <a:schemeClr val="tx1"/>
-              </a:solidFill>
-            </a:endParaRPr>
-          </a:p>
-          <a:p>
-            <a:pPr marL="514350" indent="-514350" algn="l" rtl="0">
-              <a:buFont typeface="+mj-lt"/>
-              <a:buAutoNum type="arabicPeriod"/>
-            </a:pPr>
-            <a:r>
-              <a:rPr lang="en-US" sz="2400" dirty="0" smtClean="0">
-                <a:solidFill>
-                  <a:schemeClr val="tx1"/>
-                </a:solidFill>
-              </a:rPr>
-              <a:t>Build Test Benches in System </a:t>
-            </a:r>
-            <a:r>
-              <a:rPr lang="en-US" sz="2400" dirty="0" err="1" smtClean="0">
-                <a:solidFill>
-                  <a:schemeClr val="tx1"/>
-                </a:solidFill>
-              </a:rPr>
-              <a:t>Verilog</a:t>
-            </a:r>
-            <a:r>
-              <a:rPr lang="en-US" sz="2400" dirty="0" smtClean="0">
-                <a:solidFill>
-                  <a:schemeClr val="tx1"/>
-                </a:solidFill>
-              </a:rPr>
-              <a:t>:</a:t>
-            </a:r>
-          </a:p>
-          <a:p>
-            <a:pPr marL="971550" lvl="1" indent="-514350" algn="l" rtl="0">
-              <a:buFont typeface="+mj-lt"/>
-              <a:buAutoNum type="alphaUcPeriod"/>
-            </a:pPr>
-            <a:r>
-              <a:rPr lang="en-US" sz="2000" dirty="0" smtClean="0">
-                <a:solidFill>
-                  <a:schemeClr val="tx1"/>
-                </a:solidFill>
-              </a:rPr>
-              <a:t>Individual TB for SPI Master and Slave</a:t>
-            </a:r>
-          </a:p>
-          <a:p>
-            <a:pPr marL="971550" lvl="1" indent="-514350" algn="l" rtl="0">
-              <a:buFont typeface="+mj-lt"/>
-              <a:buAutoNum type="alphaUcPeriod"/>
-            </a:pPr>
-            <a:r>
-              <a:rPr lang="en-US" sz="2000" dirty="0" smtClean="0">
-                <a:solidFill>
-                  <a:schemeClr val="tx1"/>
-                </a:solidFill>
-              </a:rPr>
               <a:t>Top TB for the entire system</a:t>
             </a:r>
-            <a:endParaRPr lang="he-IL" sz="2000" dirty="0">
+            <a:endParaRPr lang="he-IL" sz="2400" dirty="0">
               <a:solidFill>
                 <a:schemeClr val="tx1"/>
               </a:solidFill>
@@ -5421,12 +7621,20 @@
           <a:p>
             <a:pPr algn="l" rtl="0"/>
             <a:r>
+              <a:rPr lang="en-US" b="1" dirty="0" smtClean="0">
+                <a:solidFill>
+                  <a:schemeClr val="tx1"/>
+                </a:solidFill>
+              </a:rPr>
+              <a:t>Master</a:t>
+            </a:r>
+            <a:r>
               <a:rPr lang="en-US" dirty="0" smtClean="0">
                 <a:solidFill>
                   <a:schemeClr val="tx1"/>
                 </a:solidFill>
               </a:rPr>
-              <a:t>Master:</a:t>
+              <a:t>:</a:t>
             </a:r>
           </a:p>
           <a:p>
@@ -5437,7 +7645,23 @@
                   <a:schemeClr val="tx1"/>
                 </a:solidFill>
               </a:rPr>
-              <a:t>SPI Clock is derived from the System Clock, using counter.</a:t>
+              <a:t>SPI Clock is </a:t>
+            </a:r>
+            <a:r>
+              <a:rPr lang="en-US" dirty="0" smtClean="0">
+                <a:solidFill>
+                  <a:schemeClr val="tx1"/>
+                </a:solidFill>
+              </a:rPr>
+              <a:t>generated from </a:t>
+            </a:r>
+            <a:r>
+              <a:rPr lang="en-US" dirty="0" smtClean="0">
+                <a:solidFill>
+                  <a:schemeClr val="tx1"/>
+                </a:solidFill>
+              </a:rPr>
+              <a:t>the System Clock, using counter.</a:t>
             </a:r>
           </a:p>
           <a:p>
@@ -5475,12 +7699,20 @@
           <a:p>
             <a:pPr algn="l" rtl="0"/>
             <a:r>
+              <a:rPr lang="en-US" b="1" dirty="0" smtClean="0">
+                <a:solidFill>
+                  <a:schemeClr val="tx1"/>
+                </a:solidFill>
+              </a:rPr>
+              <a:t>Slave</a:t>
+            </a:r>
+            <a:r>
               <a:rPr lang="en-US" dirty="0" smtClean="0">
                 <a:solidFill>
                   <a:schemeClr val="tx1"/>
                 </a:solidFill>
               </a:rPr>
-              <a:t>Slave: </a:t>
+              <a:t>: </a:t>
             </a:r>
           </a:p>
           <a:p>
@@ -5491,7 +7723,39 @@
                   <a:schemeClr val="tx1"/>
                 </a:solidFill>
               </a:rPr>
-              <a:t>SPI Clock is derivate.</a:t>
+              <a:t>SPI Clock </a:t>
+            </a:r>
+            <a:r>
+              <a:rPr lang="en-US" dirty="0" smtClean="0">
+                <a:solidFill>
+                  <a:schemeClr val="tx1"/>
+                </a:solidFill>
+              </a:rPr>
+              <a:t>(</a:t>
+            </a:r>
+            <a:r>
+              <a:rPr lang="en-US" dirty="0" err="1" smtClean="0">
+                <a:solidFill>
+                  <a:schemeClr val="tx1"/>
+                </a:solidFill>
+              </a:rPr>
+              <a:t>spi_clk</a:t>
+            </a:r>
+            <a:r>
+              <a:rPr lang="en-US" dirty="0" smtClean="0">
+                <a:solidFill>
+                  <a:schemeClr val="tx1"/>
+                </a:solidFill>
+              </a:rPr>
+              <a:t>) is </a:t>
+            </a:r>
+            <a:r>
+              <a:rPr lang="en-US" dirty="0" smtClean="0">
+                <a:solidFill>
+                  <a:schemeClr val="tx1"/>
+                </a:solidFill>
+              </a:rPr>
+              <a:t>derivate.</a:t>
             </a:r>
             <a:endParaRPr lang="he-IL" dirty="0">
               <a:solidFill>
@@ -5542,7 +7806,7 @@
         </p:nvSpPr>
         <p:spPr>
           <a:xfrm>
-            <a:off x="3929058" y="3486150"/>
+            <a:off x="4429124" y="3500438"/>
             <a:ext cx="476250" cy="238125"/>
           </a:xfrm>
           <a:prstGeom prst="rect">
@@ -5592,8 +7856,8 @@
         </p:nvSpPr>
         <p:spPr>
           <a:xfrm>
-            <a:off x="4500562" y="4000504"/>
-            <a:ext cx="1593578" cy="369332"/>
+            <a:off x="4500499" y="4000504"/>
+            <a:ext cx="1593641" cy="646331"/>
           </a:xfrm>
           <a:prstGeom prst="rect">
             <a:avLst/>
@@ -5619,9 +7883,22 @@
           </a:bodyPr>
           <a:lstStyle/>
           <a:p>
+            <a:pPr algn="ctr" rtl="0"/>
             <a:r>
               <a:rPr lang="en-US" dirty="0" smtClean="0"/>
-              <a:t>SPI Clock Event</a:t>
+              <a:t>SPI Clock </a:t>
+            </a:r>
+            <a:r>
+              <a:rPr lang="en-US" dirty="0" smtClean="0"/>
+              <a:t>Event</a:t>
+            </a:r>
+            <a:endParaRPr lang="he-IL" dirty="0" smtClean="0"/>
+          </a:p>
+          <a:p>
+            <a:pPr algn="ctr" rtl="0"/>
+            <a:r>
+              <a:rPr lang="en-US" dirty="0" smtClean="0"/>
+              <a:t>(MSB = ‘1’)</a:t>
             </a:r>
             <a:endParaRPr lang="he-IL" dirty="0"/>
           </a:p>
@@ -5638,8 +7915,8 @@
         </p:nvCxnSpPr>
         <p:spPr>
           <a:xfrm rot="16200000" flipV="1">
-            <a:off x="4594153" y="3297306"/>
-            <a:ext cx="276229" cy="1130168"/>
+            <a:off x="4851315" y="3554498"/>
+            <a:ext cx="261941" cy="630071"/>
           </a:xfrm>
           <a:prstGeom prst="straightConnector1">
             <a:avLst/>
@@ -6974,11 +9251,6 @@
               </a:rPr>
               <a:t>Controller</a:t>
             </a:r>
-            <a:endParaRPr lang="en-US" sz="1600" dirty="0" smtClean="0">
-              <a:solidFill>
-                <a:schemeClr val="bg1"/>
-              </a:solidFill>
-            </a:endParaRPr>
           </a:p>
         </p:txBody>
       </p:sp>
@@ -8390,8 +10662,8 @@
         </p:nvSpPr>
         <p:spPr>
           <a:xfrm>
-            <a:off x="785786" y="1928802"/>
-            <a:ext cx="6072230" cy="3929090"/>
+            <a:off x="357158" y="1928802"/>
+            <a:ext cx="6572296" cy="4143404"/>
           </a:xfrm>
           <a:prstGeom prst="rect">
             <a:avLst/>
@@ -8435,7 +10707,7 @@
         </p:nvSpPr>
         <p:spPr>
           <a:xfrm>
-            <a:off x="785786" y="3214686"/>
+            <a:off x="357158" y="3214686"/>
             <a:ext cx="1071570" cy="1000132"/>
           </a:xfrm>
           <a:prstGeom prst="rect">
@@ -8484,7 +10756,7 @@
         </p:nvSpPr>
         <p:spPr>
           <a:xfrm rot="16200000">
-            <a:off x="285720" y="3617597"/>
+            <a:off x="-142908" y="3617597"/>
             <a:ext cx="928694" cy="214314"/>
           </a:xfrm>
           <a:prstGeom prst="roundRect">
@@ -8528,7 +10800,7 @@
         </p:nvSpPr>
         <p:spPr>
           <a:xfrm>
-            <a:off x="2571736" y="2428868"/>
+            <a:off x="2143108" y="2428868"/>
             <a:ext cx="1071570" cy="1357322"/>
           </a:xfrm>
           <a:prstGeom prst="rect">
@@ -8580,7 +10852,7 @@
         </p:nvCxnSpPr>
         <p:spPr>
           <a:xfrm flipV="1">
-            <a:off x="1857358" y="3107529"/>
+            <a:off x="1428730" y="3107529"/>
             <a:ext cx="714378" cy="321471"/>
           </a:xfrm>
           <a:prstGeom prst="bentConnector3">
@@ -8662,17 +10934,19 @@
           <p:cNvPr id="48" name="Elbow Connector 47"/>
           <p:cNvCxnSpPr>
             <a:stCxn id="47" idx="1"/>
+            <a:endCxn id="98" idx="2"/>
           </p:cNvCxnSpPr>
           <p:nvPr/>
         </p:nvCxnSpPr>
         <p:spPr>
-          <a:xfrm rot="10800000">
-            <a:off x="1857356" y="4071943"/>
-            <a:ext cx="714380" cy="678661"/>
-          </a:xfrm>
-          <a:prstGeom prst="bentConnector3">
+          <a:xfrm rot="10800000" flipV="1">
+            <a:off x="1893076" y="4750602"/>
+            <a:ext cx="678661" cy="35719"/>
+          </a:xfrm>
+          <a:prstGeom prst="bentConnector4">
             <a:avLst>
-              <a:gd name="adj1" fmla="val 50000"/>
+              <a:gd name="adj1" fmla="val 26316"/>
+              <a:gd name="adj2" fmla="val 1159616"/>
             </a:avLst>
           </a:prstGeom>
           <a:ln>
@@ -8702,7 +10976,7 @@
         </p:nvSpPr>
         <p:spPr>
           <a:xfrm>
-            <a:off x="4429124" y="3571876"/>
+            <a:off x="4000496" y="3571876"/>
             <a:ext cx="651139" cy="430887"/>
           </a:xfrm>
           <a:prstGeom prst="rect">
@@ -8755,7 +11029,7 @@
         </p:nvCxnSpPr>
         <p:spPr>
           <a:xfrm>
-            <a:off x="3643306" y="3643314"/>
+            <a:off x="3214678" y="3643314"/>
             <a:ext cx="785818" cy="144006"/>
           </a:xfrm>
           <a:prstGeom prst="bentConnector3">
@@ -8786,17 +11060,19 @@
         <p:nvCxnSpPr>
           <p:cNvPr id="51" name="Elbow Connector 33"/>
           <p:cNvCxnSpPr>
-            <a:endCxn id="52" idx="0"/>
+            <a:endCxn id="38" idx="3"/>
           </p:cNvCxnSpPr>
           <p:nvPr/>
         </p:nvCxnSpPr>
         <p:spPr>
           <a:xfrm>
-            <a:off x="3643306" y="2857496"/>
-            <a:ext cx="2654435" cy="571504"/>
-          </a:xfrm>
-          <a:prstGeom prst="bentConnector2">
-            <a:avLst/>
+            <a:off x="3214678" y="2857496"/>
+            <a:ext cx="1643074" cy="178595"/>
+          </a:xfrm>
+          <a:prstGeom prst="bentConnector3">
+            <a:avLst>
+              <a:gd name="adj1" fmla="val 50000"/>
+            </a:avLst>
           </a:prstGeom>
           <a:ln>
             <a:tailEnd type="arrow"/>
@@ -8825,7 +11101,7 @@
         </p:nvSpPr>
         <p:spPr>
           <a:xfrm>
-            <a:off x="5786446" y="3429000"/>
+            <a:off x="5835427" y="3429000"/>
             <a:ext cx="1022589" cy="584775"/>
           </a:xfrm>
           <a:prstGeom prst="rect">
@@ -8867,42 +11143,6 @@
           </a:p>
         </p:txBody>
       </p:sp>
-      <p:cxnSp>
-        <p:nvCxnSpPr>
-          <p:cNvPr id="53" name="Shape 52"/>
-          <p:cNvCxnSpPr>
-            <a:stCxn id="52" idx="2"/>
-          </p:cNvCxnSpPr>
-          <p:nvPr/>
-        </p:nvCxnSpPr>
-        <p:spPr>
-          <a:xfrm rot="5400000">
-            <a:off x="5405788" y="3537178"/>
-            <a:ext cx="415357" cy="1368551"/>
-          </a:xfrm>
-          <a:prstGeom prst="bentConnector2">
-            <a:avLst/>
-          </a:prstGeom>
-          <a:ln>
-            <a:headEnd type="arrow"/>
-            <a:tailEnd type="arrow"/>
-          </a:ln>
-        </p:spPr>
-        <p:style>
-          <a:lnRef idx="2">
-            <a:schemeClr val="dk1"/>
-          </a:lnRef>
-          <a:fillRef idx="0">
-            <a:schemeClr val="dk1"/>
-          </a:fillRef>
-          <a:effectRef idx="1">
-            <a:schemeClr val="dk1"/>
-          </a:effectRef>
-          <a:fontRef idx="minor">
-            <a:schemeClr val="tx1"/>
-          </a:fontRef>
-        </p:style>
-      </p:cxnSp>
       <p:sp>
         <p:nvSpPr>
           <p:cNvPr id="54" name="TextBox 53"/>
@@ -8911,7 +11151,7 @@
         </p:nvSpPr>
         <p:spPr>
           <a:xfrm>
-            <a:off x="5286380" y="4857760"/>
+            <a:off x="4786314" y="4926939"/>
             <a:ext cx="705642" cy="430887"/>
           </a:xfrm>
           <a:prstGeom prst="rect">
@@ -8962,7 +11202,7 @@
         </p:nvSpPr>
         <p:spPr>
           <a:xfrm rot="5400000" flipV="1">
-            <a:off x="4214810" y="4500570"/>
+            <a:off x="3786182" y="4500570"/>
             <a:ext cx="928694" cy="500066"/>
           </a:xfrm>
           <a:prstGeom prst="snip2SameRect">
@@ -9009,8 +11249,8 @@
         </p:nvCxnSpPr>
         <p:spPr>
           <a:xfrm rot="10800000">
-            <a:off x="4929190" y="4929198"/>
-            <a:ext cx="357190" cy="144006"/>
+            <a:off x="4500562" y="5000637"/>
+            <a:ext cx="285752" cy="141747"/>
           </a:xfrm>
           <a:prstGeom prst="bentConnector3">
             <a:avLst>
@@ -9023,13 +11263,13 @@
         </p:spPr>
         <p:style>
           <a:lnRef idx="2">
-            <a:schemeClr val="dk1"/>
+            <a:schemeClr val="accent2"/>
           </a:lnRef>
           <a:fillRef idx="0">
-            <a:schemeClr val="dk1"/>
+            <a:schemeClr val="accent2"/>
           </a:fillRef>
           <a:effectRef idx="1">
-            <a:schemeClr val="dk1"/>
+            <a:schemeClr val="accent2"/>
           </a:effectRef>
           <a:fontRef idx="minor">
             <a:schemeClr val="tx1"/>
@@ -9046,7 +11286,7 @@
         </p:nvCxnSpPr>
         <p:spPr>
           <a:xfrm rot="16200000" flipH="1">
-            <a:off x="4628758" y="4128699"/>
+            <a:off x="4200130" y="4128699"/>
             <a:ext cx="283493" cy="31620"/>
           </a:xfrm>
           <a:prstGeom prst="bentConnector3">
@@ -9059,14 +11299,14 @@
           </a:ln>
         </p:spPr>
         <p:style>
-          <a:lnRef idx="1">
-            <a:schemeClr val="dk1"/>
+          <a:lnRef idx="2">
+            <a:schemeClr val="accent4"/>
           </a:lnRef>
           <a:fillRef idx="0">
-            <a:schemeClr val="dk1"/>
+            <a:schemeClr val="accent4"/>
           </a:fillRef>
-          <a:effectRef idx="0">
-            <a:schemeClr val="dk1"/>
+          <a:effectRef idx="1">
+            <a:schemeClr val="accent4"/>
           </a:effectRef>
           <a:fontRef idx="minor">
             <a:schemeClr val="tx1"/>
@@ -9085,7 +11325,7 @@
         <p:spPr>
           <a:xfrm rot="10800000">
             <a:off x="3643306" y="4750603"/>
-            <a:ext cx="785818" cy="1588"/>
+            <a:ext cx="357190" cy="1588"/>
           </a:xfrm>
           <a:prstGeom prst="bentConnector3">
             <a:avLst>
@@ -9119,7 +11359,7 @@
         </p:nvSpPr>
         <p:spPr>
           <a:xfrm rot="16200000">
-            <a:off x="6357950" y="3643314"/>
+            <a:off x="6429388" y="3643314"/>
             <a:ext cx="1071570" cy="214314"/>
           </a:xfrm>
           <a:prstGeom prst="roundRect">
@@ -9163,7 +11403,7 @@
         </p:nvSpPr>
         <p:spPr>
           <a:xfrm>
-            <a:off x="785786" y="1928802"/>
+            <a:off x="357158" y="1928802"/>
             <a:ext cx="1143008" cy="369332"/>
           </a:xfrm>
           <a:prstGeom prst="rect">
@@ -9207,7 +11447,7 @@
         </p:nvSpPr>
         <p:spPr>
           <a:xfrm>
-            <a:off x="7700800" y="3874005"/>
+            <a:off x="7772238" y="3874005"/>
             <a:ext cx="1300356" cy="769441"/>
           </a:xfrm>
           <a:prstGeom prst="rect">
@@ -9254,7 +11494,7 @@
         </p:nvCxnSpPr>
         <p:spPr>
           <a:xfrm>
-            <a:off x="7000892" y="3750471"/>
+            <a:off x="7072330" y="3750471"/>
             <a:ext cx="699908" cy="508255"/>
           </a:xfrm>
           <a:prstGeom prst="bentConnector3">
@@ -9290,7 +11530,7 @@
         </p:nvSpPr>
         <p:spPr>
           <a:xfrm>
-            <a:off x="2428860" y="6143644"/>
+            <a:off x="2500298" y="1428736"/>
             <a:ext cx="2189382" cy="369332"/>
           </a:xfrm>
           <a:prstGeom prst="rect">
@@ -9329,15 +11569,14 @@
         <p:nvCxnSpPr>
           <p:cNvPr id="65" name="Straight Arrow Connector 64"/>
           <p:cNvCxnSpPr>
-            <a:stCxn id="63" idx="0"/>
-            <a:endCxn id="43" idx="2"/>
+            <a:stCxn id="63" idx="2"/>
           </p:cNvCxnSpPr>
           <p:nvPr/>
         </p:nvCxnSpPr>
         <p:spPr>
-          <a:xfrm rot="16200000" flipV="1">
-            <a:off x="1458148" y="4078241"/>
-            <a:ext cx="1928826" cy="2201980"/>
+          <a:xfrm rot="5400000">
+            <a:off x="1553517" y="1173214"/>
+            <a:ext cx="1416618" cy="2666327"/>
           </a:xfrm>
           <a:prstGeom prst="straightConnector1">
             <a:avLst/>
@@ -9345,6 +11584,19 @@
           <a:ln>
             <a:tailEnd type="arrow"/>
           </a:ln>
+          <a:effectLst>
+            <a:glow rad="228600">
+              <a:schemeClr val="accent2">
+                <a:satMod val="175000"/>
+                <a:alpha val="40000"/>
+              </a:schemeClr>
+            </a:glow>
+            <a:outerShdw blurRad="40000" dist="23000" dir="5400000" rotWithShape="0">
+              <a:srgbClr val="000000">
+                <a:alpha val="35000"/>
+              </a:srgbClr>
+            </a:outerShdw>
+          </a:effectLst>
         </p:spPr>
         <p:style>
           <a:lnRef idx="3">
@@ -9363,17 +11615,238 @@
       </p:cxnSp>
       <p:cxnSp>
         <p:nvCxnSpPr>
+          <p:cNvPr id="28" name="Shape 27"/>
+          <p:cNvCxnSpPr>
+            <a:stCxn id="54" idx="2"/>
+            <a:endCxn id="43" idx="2"/>
+          </p:cNvCxnSpPr>
+          <p:nvPr/>
+        </p:nvCxnSpPr>
+        <p:spPr>
+          <a:xfrm rot="5400000" flipH="1">
+            <a:off x="2444535" y="2663226"/>
+            <a:ext cx="1143008" cy="4246192"/>
+          </a:xfrm>
+          <a:prstGeom prst="bentConnector3">
+            <a:avLst>
+              <a:gd name="adj1" fmla="val -20000"/>
+            </a:avLst>
+          </a:prstGeom>
+          <a:ln>
+            <a:tailEnd type="arrow"/>
+          </a:ln>
+        </p:spPr>
+        <p:style>
+          <a:lnRef idx="3">
+            <a:schemeClr val="accent6"/>
+          </a:lnRef>
+          <a:fillRef idx="0">
+            <a:schemeClr val="accent6"/>
+          </a:fillRef>
+          <a:effectRef idx="2">
+            <a:schemeClr val="accent6"/>
+          </a:effectRef>
+          <a:fontRef idx="minor">
+            <a:schemeClr val="tx1"/>
+          </a:fontRef>
+        </p:style>
+      </p:cxnSp>
+      <p:sp>
+        <p:nvSpPr>
+          <p:cNvPr id="36" name="TextBox 35"/>
+          <p:cNvSpPr txBox="1"/>
+          <p:nvPr/>
+        </p:nvSpPr>
+        <p:spPr>
+          <a:xfrm>
+            <a:off x="2787615" y="5572140"/>
+            <a:ext cx="949940" cy="276999"/>
+          </a:xfrm>
+          <a:prstGeom prst="rect">
+            <a:avLst/>
+          </a:prstGeom>
+          <a:noFill/>
+        </p:spPr>
+        <p:txBody>
+          <a:bodyPr wrap="none" rtlCol="1">
+            <a:spAutoFit/>
+          </a:bodyPr>
+          <a:lstStyle/>
+          <a:p>
+            <a:r>
+              <a:rPr lang="en-US" sz="1200" b="1" dirty="0" smtClean="0"/>
+              <a:t>CPOL, CPHA</a:t>
+            </a:r>
+            <a:endParaRPr lang="he-IL" sz="1200" b="1" dirty="0"/>
+          </a:p>
+        </p:txBody>
+      </p:sp>
+      <p:sp>
+        <p:nvSpPr>
+          <p:cNvPr id="38" name="Snip Same Side Corner Rectangle 37"/>
+          <p:cNvSpPr/>
+          <p:nvPr/>
+        </p:nvSpPr>
+        <p:spPr>
+          <a:xfrm rot="5400000" flipV="1">
+            <a:off x="4607719" y="2821777"/>
+            <a:ext cx="928694" cy="428628"/>
+          </a:xfrm>
+          <a:prstGeom prst="snip2SameRect">
+            <a:avLst>
+              <a:gd name="adj1" fmla="val 46000"/>
+              <a:gd name="adj2" fmla="val 0"/>
+            </a:avLst>
+          </a:prstGeom>
+        </p:spPr>
+        <p:style>
+          <a:lnRef idx="0">
+            <a:schemeClr val="accent3"/>
+          </a:lnRef>
+          <a:fillRef idx="3">
+            <a:schemeClr val="accent3"/>
+          </a:fillRef>
+          <a:effectRef idx="3">
+            <a:schemeClr val="accent3"/>
+          </a:effectRef>
+          <a:fontRef idx="minor">
+            <a:schemeClr val="lt1"/>
+          </a:fontRef>
+        </p:style>
+        <p:txBody>
+          <a:bodyPr rtlCol="1" anchor="ctr"/>
+          <a:lstStyle/>
+          <a:p>
+            <a:pPr algn="ctr"/>
+            <a:r>
+              <a:rPr lang="en-US" dirty="0" smtClean="0"/>
+              <a:t>DEC</a:t>
+            </a:r>
+            <a:endParaRPr lang="he-IL" dirty="0"/>
+          </a:p>
+        </p:txBody>
+      </p:sp>
+      <p:cxnSp>
+        <p:nvCxnSpPr>
+          <p:cNvPr id="70" name="Elbow Connector 33"/>
+          <p:cNvCxnSpPr>
+            <a:endCxn id="52" idx="0"/>
+          </p:cNvCxnSpPr>
+          <p:nvPr/>
+        </p:nvCxnSpPr>
+        <p:spPr>
+          <a:xfrm>
+            <a:off x="5286380" y="2786058"/>
+            <a:ext cx="1060342" cy="642942"/>
+          </a:xfrm>
+          <a:prstGeom prst="bentConnector2">
+            <a:avLst/>
+          </a:prstGeom>
+          <a:ln>
+            <a:tailEnd type="arrow"/>
+          </a:ln>
+        </p:spPr>
+        <p:style>
+          <a:lnRef idx="2">
+            <a:schemeClr val="dk1"/>
+          </a:lnRef>
+          <a:fillRef idx="0">
+            <a:schemeClr val="dk1"/>
+          </a:fillRef>
+          <a:effectRef idx="1">
+            <a:schemeClr val="dk1"/>
+          </a:effectRef>
+          <a:fontRef idx="minor">
+            <a:schemeClr val="tx1"/>
+          </a:fontRef>
+        </p:style>
+      </p:cxnSp>
+      <p:cxnSp>
+        <p:nvCxnSpPr>
+          <p:cNvPr id="73" name="Elbow Connector 33"/>
+          <p:cNvCxnSpPr>
+            <a:endCxn id="54" idx="3"/>
+          </p:cNvCxnSpPr>
+          <p:nvPr/>
+        </p:nvCxnSpPr>
+        <p:spPr>
+          <a:xfrm rot="16200000" flipH="1">
+            <a:off x="4461041" y="4111467"/>
+            <a:ext cx="1856257" cy="205574"/>
+          </a:xfrm>
+          <a:prstGeom prst="bentConnector4">
+            <a:avLst>
+              <a:gd name="adj1" fmla="val 249"/>
+              <a:gd name="adj2" fmla="val 211201"/>
+            </a:avLst>
+          </a:prstGeom>
+          <a:ln>
+            <a:tailEnd type="arrow"/>
+          </a:ln>
+        </p:spPr>
+        <p:style>
+          <a:lnRef idx="2">
+            <a:schemeClr val="dk1"/>
+          </a:lnRef>
+          <a:fillRef idx="0">
+            <a:schemeClr val="dk1"/>
+          </a:fillRef>
+          <a:effectRef idx="1">
+            <a:schemeClr val="dk1"/>
+          </a:effectRef>
+          <a:fontRef idx="minor">
+            <a:schemeClr val="tx1"/>
+          </a:fontRef>
+        </p:style>
+      </p:cxnSp>
+      <p:cxnSp>
+        <p:nvCxnSpPr>
+          <p:cNvPr id="79" name="Elbow Connector 33"/>
+          <p:cNvCxnSpPr>
+            <a:stCxn id="52" idx="2"/>
+          </p:cNvCxnSpPr>
+          <p:nvPr/>
+        </p:nvCxnSpPr>
+        <p:spPr>
+          <a:xfrm rot="5400000">
+            <a:off x="5215963" y="3298374"/>
+            <a:ext cx="415359" cy="1846160"/>
+          </a:xfrm>
+          <a:prstGeom prst="bentConnector2">
+            <a:avLst/>
+          </a:prstGeom>
+          <a:ln>
+            <a:tailEnd type="arrow"/>
+          </a:ln>
+        </p:spPr>
+        <p:style>
+          <a:lnRef idx="3">
+            <a:schemeClr val="accent2"/>
+          </a:lnRef>
+          <a:fillRef idx="0">
+            <a:schemeClr val="accent2"/>
+          </a:fillRef>
+          <a:effectRef idx="2">
+            <a:schemeClr val="accent2"/>
+          </a:effectRef>
+          <a:fontRef idx="minor">
+            <a:schemeClr val="tx1"/>
+          </a:fontRef>
+        </p:style>
+      </p:cxnSp>
+      <p:cxnSp>
+        <p:nvCxnSpPr>
           <p:cNvPr id="66" name="Straight Arrow Connector 65"/>
           <p:cNvCxnSpPr>
-            <a:stCxn id="63" idx="0"/>
+            <a:stCxn id="63" idx="2"/>
             <a:endCxn id="52" idx="1"/>
           </p:cNvCxnSpPr>
           <p:nvPr/>
         </p:nvCxnSpPr>
         <p:spPr>
-          <a:xfrm rot="5400000" flipH="1" flipV="1">
-            <a:off x="3443870" y="3801069"/>
-            <a:ext cx="2422256" cy="2262895"/>
+          <a:xfrm rot="16200000" flipH="1">
+            <a:off x="3753548" y="1639509"/>
+            <a:ext cx="1923320" cy="2240438"/>
           </a:xfrm>
           <a:prstGeom prst="straightConnector1">
             <a:avLst/>
@@ -9381,6 +11854,19 @@
           <a:ln>
             <a:tailEnd type="arrow"/>
           </a:ln>
+          <a:effectLst>
+            <a:glow rad="228600">
+              <a:schemeClr val="accent2">
+                <a:satMod val="175000"/>
+                <a:alpha val="40000"/>
+              </a:schemeClr>
+            </a:glow>
+            <a:outerShdw blurRad="40000" dist="23000" dir="5400000" rotWithShape="0">
+              <a:srgbClr val="000000">
+                <a:alpha val="35000"/>
+              </a:srgbClr>
+            </a:outerShdw>
+          </a:effectLst>
         </p:spPr>
         <p:style>
           <a:lnRef idx="3">
@@ -9397,6 +11883,229 @@
           </a:fontRef>
         </p:style>
       </p:cxnSp>
+      <p:cxnSp>
+        <p:nvCxnSpPr>
+          <p:cNvPr id="91" name="Elbow Connector 90"/>
+          <p:cNvCxnSpPr>
+            <a:stCxn id="49" idx="0"/>
+            <a:endCxn id="38" idx="2"/>
+          </p:cNvCxnSpPr>
+          <p:nvPr/>
+        </p:nvCxnSpPr>
+        <p:spPr>
+          <a:xfrm rot="5400000" flipH="1" flipV="1">
+            <a:off x="4199000" y="2698810"/>
+            <a:ext cx="1000132" cy="746000"/>
+          </a:xfrm>
+          <a:prstGeom prst="bentConnector3">
+            <a:avLst>
+              <a:gd name="adj1" fmla="val 114888"/>
+            </a:avLst>
+          </a:prstGeom>
+          <a:ln>
+            <a:tailEnd type="arrow"/>
+          </a:ln>
+        </p:spPr>
+        <p:style>
+          <a:lnRef idx="2">
+            <a:schemeClr val="accent4"/>
+          </a:lnRef>
+          <a:fillRef idx="0">
+            <a:schemeClr val="accent4"/>
+          </a:fillRef>
+          <a:effectRef idx="1">
+            <a:schemeClr val="accent4"/>
+          </a:effectRef>
+          <a:fontRef idx="minor">
+            <a:schemeClr val="tx1"/>
+          </a:fontRef>
+        </p:style>
+      </p:cxnSp>
+      <p:pic>
+        <p:nvPicPr>
+          <p:cNvPr id="2050" name="Picture 2"/>
+          <p:cNvPicPr>
+            <a:picLocks noChangeAspect="1" noChangeArrowheads="1"/>
+          </p:cNvPicPr>
+          <p:nvPr/>
+        </p:nvPicPr>
+        <p:blipFill>
+          <a:blip r:embed="rId2"/>
+          <a:srcRect/>
+          <a:stretch>
+            <a:fillRect/>
+          </a:stretch>
+        </p:blipFill>
+        <p:spPr bwMode="auto">
+          <a:xfrm>
+            <a:off x="2000232" y="2928934"/>
+            <a:ext cx="1428750" cy="390525"/>
+          </a:xfrm>
+          <a:prstGeom prst="rect">
+            <a:avLst/>
+          </a:prstGeom>
+          <a:noFill/>
+          <a:ln w="9525">
+            <a:noFill/>
+            <a:miter lim="800000"/>
+            <a:headEnd/>
+            <a:tailEnd/>
+          </a:ln>
+          <a:effectLst/>
+        </p:spPr>
+      </p:pic>
+      <p:pic>
+        <p:nvPicPr>
+          <p:cNvPr id="2051" name="Picture 3"/>
+          <p:cNvPicPr>
+            <a:picLocks noChangeAspect="1" noChangeArrowheads="1"/>
+          </p:cNvPicPr>
+          <p:nvPr/>
+        </p:nvPicPr>
+        <p:blipFill>
+          <a:blip r:embed="rId3"/>
+          <a:srcRect/>
+          <a:stretch>
+            <a:fillRect/>
+          </a:stretch>
+        </p:blipFill>
+        <p:spPr bwMode="auto">
+          <a:xfrm>
+            <a:off x="2000232" y="2214554"/>
+            <a:ext cx="1419225" cy="1733550"/>
+          </a:xfrm>
+          <a:prstGeom prst="rect">
+            <a:avLst/>
+          </a:prstGeom>
+          <a:noFill/>
+          <a:ln w="9525">
+            <a:noFill/>
+            <a:miter lim="800000"/>
+            <a:headEnd/>
+            <a:tailEnd/>
+          </a:ln>
+          <a:effectLst/>
+        </p:spPr>
+      </p:pic>
+      <p:sp>
+        <p:nvSpPr>
+          <p:cNvPr id="98" name="Rectangle 97"/>
+          <p:cNvSpPr/>
+          <p:nvPr/>
+        </p:nvSpPr>
+        <p:spPr>
+          <a:xfrm>
+            <a:off x="1571604" y="4214818"/>
+            <a:ext cx="642942" cy="571504"/>
+          </a:xfrm>
+          <a:prstGeom prst="rect">
+            <a:avLst/>
+          </a:prstGeom>
+        </p:spPr>
+        <p:style>
+          <a:lnRef idx="0">
+            <a:schemeClr val="accent6"/>
+          </a:lnRef>
+          <a:fillRef idx="3">
+            <a:schemeClr val="accent6"/>
+          </a:fillRef>
+          <a:effectRef idx="3">
+            <a:schemeClr val="accent6"/>
+          </a:effectRef>
+          <a:fontRef idx="minor">
+            <a:schemeClr val="lt1"/>
+          </a:fontRef>
+        </p:style>
+        <p:txBody>
+          <a:bodyPr rtlCol="1" anchor="ctr"/>
+          <a:lstStyle/>
+          <a:p>
+            <a:pPr algn="ctr"/>
+            <a:r>
+              <a:rPr lang="en-US" sz="1400" dirty="0" smtClean="0">
+                <a:solidFill>
+                  <a:schemeClr val="tx1"/>
+                </a:solidFill>
+              </a:rPr>
+              <a:t>FIFO</a:t>
+            </a:r>
+            <a:endParaRPr lang="he-IL" sz="1400" dirty="0">
+              <a:solidFill>
+                <a:schemeClr val="tx1"/>
+              </a:solidFill>
+            </a:endParaRPr>
+          </a:p>
+        </p:txBody>
+      </p:sp>
+      <p:cxnSp>
+        <p:nvCxnSpPr>
+          <p:cNvPr id="102" name="Elbow Connector 47"/>
+          <p:cNvCxnSpPr>
+            <a:stCxn id="98" idx="0"/>
+            <a:endCxn id="43" idx="3"/>
+          </p:cNvCxnSpPr>
+          <p:nvPr/>
+        </p:nvCxnSpPr>
+        <p:spPr>
+          <a:xfrm rot="16200000" flipV="1">
+            <a:off x="1410869" y="3732611"/>
+            <a:ext cx="500066" cy="464347"/>
+          </a:xfrm>
+          <a:prstGeom prst="bentConnector2">
+            <a:avLst/>
+          </a:prstGeom>
+          <a:ln>
+            <a:tailEnd type="arrow"/>
+          </a:ln>
+        </p:spPr>
+        <p:style>
+          <a:lnRef idx="3">
+            <a:schemeClr val="accent2"/>
+          </a:lnRef>
+          <a:fillRef idx="0">
+            <a:schemeClr val="accent2"/>
+          </a:fillRef>
+          <a:effectRef idx="2">
+            <a:schemeClr val="accent2"/>
+          </a:effectRef>
+          <a:fontRef idx="minor">
+            <a:schemeClr val="tx1"/>
+          </a:fontRef>
+        </p:style>
+      </p:cxnSp>
+      <p:pic>
+        <p:nvPicPr>
+          <p:cNvPr id="90" name="Picture 2"/>
+          <p:cNvPicPr>
+            <a:picLocks noChangeAspect="1" noChangeArrowheads="1"/>
+          </p:cNvPicPr>
+          <p:nvPr/>
+        </p:nvPicPr>
+        <p:blipFill>
+          <a:blip r:embed="rId4" cstate="print"/>
+          <a:srcRect/>
+          <a:stretch>
+            <a:fillRect/>
+          </a:stretch>
+        </p:blipFill>
+        <p:spPr bwMode="auto">
+          <a:xfrm>
+            <a:off x="71406" y="1928802"/>
+            <a:ext cx="1571636" cy="3771922"/>
+          </a:xfrm>
+          <a:prstGeom prst="rect">
+            <a:avLst/>
+          </a:prstGeom>
+          <a:noFill/>
+          <a:ln w="9525">
+            <a:noFill/>
+            <a:miter lim="800000"/>
+            <a:headEnd/>
+            <a:tailEnd/>
+          </a:ln>
+          <a:effectLst/>
+        </p:spPr>
+      </p:pic>
     </p:spTree>
   </p:cSld>
   <p:clrMapOvr>
@@ -9533,6 +12242,654 @@
                       </p:childTnLst>
                     </p:cTn>
                   </p:par>
+                  <p:par>
+                    <p:cTn id="14" fill="hold">
+                      <p:stCondLst>
+                        <p:cond delay="indefinite"/>
+                      </p:stCondLst>
+                      <p:childTnLst>
+                        <p:par>
+                          <p:cTn id="15" fill="hold">
+                            <p:stCondLst>
+                              <p:cond delay="0"/>
+                            </p:stCondLst>
+                            <p:childTnLst>
+                              <p:par>
+                                <p:cTn id="16" presetID="3" presetClass="entr" presetSubtype="10" fill="hold" nodeType="clickEffect">
+                                  <p:stCondLst>
+                                    <p:cond delay="0"/>
+                                  </p:stCondLst>
+                                  <p:childTnLst>
+                                    <p:set>
+                                      <p:cBhvr>
+                                        <p:cTn id="17" dur="1" fill="hold">
+                                          <p:stCondLst>
+                                            <p:cond delay="0"/>
+                                          </p:stCondLst>
+                                        </p:cTn>
+                                        <p:tgtEl>
+                                          <p:spTgt spid="90"/>
+                                        </p:tgtEl>
+                                        <p:attrNameLst>
+                                          <p:attrName>style.visibility</p:attrName>
+                                        </p:attrNameLst>
+                                      </p:cBhvr>
+                                      <p:to>
+                                        <p:strVal val="visible"/>
+                                      </p:to>
+                                    </p:set>
+                                    <p:animEffect transition="in" filter="blinds(horizontal)">
+                                      <p:cBhvr>
+                                        <p:cTn id="18" dur="500"/>
+                                        <p:tgtEl>
+                                          <p:spTgt spid="90"/>
+                                        </p:tgtEl>
+                                      </p:cBhvr>
+                                    </p:animEffect>
+                                  </p:childTnLst>
+                                </p:cTn>
+                              </p:par>
+                              <p:par>
+                                <p:cTn id="19" presetID="3" presetClass="exit" presetSubtype="10" fill="hold" grpId="1" nodeType="withEffect">
+                                  <p:stCondLst>
+                                    <p:cond delay="0"/>
+                                  </p:stCondLst>
+                                  <p:childTnLst>
+                                    <p:animEffect transition="out" filter="blinds(horizontal)">
+                                      <p:cBhvr>
+                                        <p:cTn id="20" dur="500"/>
+                                        <p:tgtEl>
+                                          <p:spTgt spid="63"/>
+                                        </p:tgtEl>
+                                      </p:cBhvr>
+                                    </p:animEffect>
+                                    <p:set>
+                                      <p:cBhvr>
+                                        <p:cTn id="21" dur="1" fill="hold">
+                                          <p:stCondLst>
+                                            <p:cond delay="499"/>
+                                          </p:stCondLst>
+                                        </p:cTn>
+                                        <p:tgtEl>
+                                          <p:spTgt spid="63"/>
+                                        </p:tgtEl>
+                                        <p:attrNameLst>
+                                          <p:attrName>style.visibility</p:attrName>
+                                        </p:attrNameLst>
+                                      </p:cBhvr>
+                                      <p:to>
+                                        <p:strVal val="hidden"/>
+                                      </p:to>
+                                    </p:set>
+                                  </p:childTnLst>
+                                </p:cTn>
+                              </p:par>
+                              <p:par>
+                                <p:cTn id="22" presetID="3" presetClass="exit" presetSubtype="10" fill="hold" nodeType="withEffect">
+                                  <p:stCondLst>
+                                    <p:cond delay="0"/>
+                                  </p:stCondLst>
+                                  <p:childTnLst>
+                                    <p:animEffect transition="out" filter="blinds(horizontal)">
+                                      <p:cBhvr>
+                                        <p:cTn id="23" dur="500"/>
+                                        <p:tgtEl>
+                                          <p:spTgt spid="66"/>
+                                        </p:tgtEl>
+                                      </p:cBhvr>
+                                    </p:animEffect>
+                                    <p:set>
+                                      <p:cBhvr>
+                                        <p:cTn id="24" dur="1" fill="hold">
+                                          <p:stCondLst>
+                                            <p:cond delay="499"/>
+                                          </p:stCondLst>
+                                        </p:cTn>
+                                        <p:tgtEl>
+                                          <p:spTgt spid="66"/>
+                                        </p:tgtEl>
+                                        <p:attrNameLst>
+                                          <p:attrName>style.visibility</p:attrName>
+                                        </p:attrNameLst>
+                                      </p:cBhvr>
+                                      <p:to>
+                                        <p:strVal val="hidden"/>
+                                      </p:to>
+                                    </p:set>
+                                  </p:childTnLst>
+                                </p:cTn>
+                              </p:par>
+                              <p:par>
+                                <p:cTn id="25" presetID="3" presetClass="exit" presetSubtype="10" fill="hold" nodeType="withEffect">
+                                  <p:stCondLst>
+                                    <p:cond delay="0"/>
+                                  </p:stCondLst>
+                                  <p:childTnLst>
+                                    <p:animEffect transition="out" filter="blinds(horizontal)">
+                                      <p:cBhvr>
+                                        <p:cTn id="26" dur="500"/>
+                                        <p:tgtEl>
+                                          <p:spTgt spid="65"/>
+                                        </p:tgtEl>
+                                      </p:cBhvr>
+                                    </p:animEffect>
+                                    <p:set>
+                                      <p:cBhvr>
+                                        <p:cTn id="27" dur="1" fill="hold">
+                                          <p:stCondLst>
+                                            <p:cond delay="499"/>
+                                          </p:stCondLst>
+                                        </p:cTn>
+                                        <p:tgtEl>
+                                          <p:spTgt spid="65"/>
+                                        </p:tgtEl>
+                                        <p:attrNameLst>
+                                          <p:attrName>style.visibility</p:attrName>
+                                        </p:attrNameLst>
+                                      </p:cBhvr>
+                                      <p:to>
+                                        <p:strVal val="hidden"/>
+                                      </p:to>
+                                    </p:set>
+                                  </p:childTnLst>
+                                </p:cTn>
+                              </p:par>
+                            </p:childTnLst>
+                          </p:cTn>
+                        </p:par>
+                      </p:childTnLst>
+                    </p:cTn>
+                  </p:par>
+                  <p:par>
+                    <p:cTn id="28" fill="hold">
+                      <p:stCondLst>
+                        <p:cond delay="indefinite"/>
+                      </p:stCondLst>
+                      <p:childTnLst>
+                        <p:par>
+                          <p:cTn id="29" fill="hold">
+                            <p:stCondLst>
+                              <p:cond delay="0"/>
+                            </p:stCondLst>
+                            <p:childTnLst>
+                              <p:par>
+                                <p:cTn id="30" presetID="6" presetClass="emph" presetSubtype="0" fill="hold" nodeType="clickEffect">
+                                  <p:stCondLst>
+                                    <p:cond delay="0"/>
+                                  </p:stCondLst>
+                                  <p:childTnLst>
+                                    <p:animScale>
+                                      <p:cBhvr>
+                                        <p:cTn id="31" dur="500" fill="hold"/>
+                                        <p:tgtEl>
+                                          <p:spTgt spid="90"/>
+                                        </p:tgtEl>
+                                      </p:cBhvr>
+                                      <p:by x="25000" y="25000"/>
+                                    </p:animScale>
+                                  </p:childTnLst>
+                                </p:cTn>
+                              </p:par>
+                            </p:childTnLst>
+                          </p:cTn>
+                        </p:par>
+                      </p:childTnLst>
+                    </p:cTn>
+                  </p:par>
+                  <p:par>
+                    <p:cTn id="32" fill="hold">
+                      <p:stCondLst>
+                        <p:cond delay="indefinite"/>
+                      </p:stCondLst>
+                      <p:childTnLst>
+                        <p:par>
+                          <p:cTn id="33" fill="hold">
+                            <p:stCondLst>
+                              <p:cond delay="0"/>
+                            </p:stCondLst>
+                            <p:childTnLst>
+                              <p:par>
+                                <p:cTn id="34" presetID="0" presetClass="path" presetSubtype="0" accel="50000" decel="50000" fill="hold" nodeType="clickEffect">
+                                  <p:stCondLst>
+                                    <p:cond delay="0"/>
+                                  </p:stCondLst>
+                                  <p:childTnLst>
+                                    <p:animMotion origin="layout" path="M 4.16667E-6 -3.7037E-6 L 0.00104 -0.03935 L 0.10295 -0.04051 L 0.10295 -0.08634 L 0.20295 -0.08634 " pathEditMode="relative" ptsTypes="AAAAA">
+                                      <p:cBhvr>
+                                        <p:cTn id="35" dur="2000" fill="hold"/>
+                                        <p:tgtEl>
+                                          <p:spTgt spid="90"/>
+                                        </p:tgtEl>
+                                        <p:attrNameLst>
+                                          <p:attrName>ppt_x</p:attrName>
+                                          <p:attrName>ppt_y</p:attrName>
+                                        </p:attrNameLst>
+                                      </p:cBhvr>
+                                    </p:animMotion>
+                                  </p:childTnLst>
+                                </p:cTn>
+                              </p:par>
+                            </p:childTnLst>
+                          </p:cTn>
+                        </p:par>
+                      </p:childTnLst>
+                    </p:cTn>
+                  </p:par>
+                  <p:par>
+                    <p:cTn id="36" fill="hold">
+                      <p:stCondLst>
+                        <p:cond delay="indefinite"/>
+                      </p:stCondLst>
+                      <p:childTnLst>
+                        <p:par>
+                          <p:cTn id="37" fill="hold">
+                            <p:stCondLst>
+                              <p:cond delay="0"/>
+                            </p:stCondLst>
+                            <p:childTnLst>
+                              <p:par>
+                                <p:cTn id="38" presetID="3" presetClass="exit" presetSubtype="10" fill="hold" nodeType="clickEffect">
+                                  <p:stCondLst>
+                                    <p:cond delay="0"/>
+                                  </p:stCondLst>
+                                  <p:childTnLst>
+                                    <p:animEffect transition="out" filter="blinds(horizontal)">
+                                      <p:cBhvr>
+                                        <p:cTn id="39" dur="500"/>
+                                        <p:tgtEl>
+                                          <p:spTgt spid="90"/>
+                                        </p:tgtEl>
+                                      </p:cBhvr>
+                                    </p:animEffect>
+                                    <p:set>
+                                      <p:cBhvr>
+                                        <p:cTn id="40" dur="1" fill="hold">
+                                          <p:stCondLst>
+                                            <p:cond delay="499"/>
+                                          </p:stCondLst>
+                                        </p:cTn>
+                                        <p:tgtEl>
+                                          <p:spTgt spid="90"/>
+                                        </p:tgtEl>
+                                        <p:attrNameLst>
+                                          <p:attrName>style.visibility</p:attrName>
+                                        </p:attrNameLst>
+                                      </p:cBhvr>
+                                      <p:to>
+                                        <p:strVal val="hidden"/>
+                                      </p:to>
+                                    </p:set>
+                                  </p:childTnLst>
+                                </p:cTn>
+                              </p:par>
+                            </p:childTnLst>
+                          </p:cTn>
+                        </p:par>
+                      </p:childTnLst>
+                    </p:cTn>
+                  </p:par>
+                  <p:par>
+                    <p:cTn id="41" fill="hold">
+                      <p:stCondLst>
+                        <p:cond delay="indefinite"/>
+                      </p:stCondLst>
+                      <p:childTnLst>
+                        <p:par>
+                          <p:cTn id="42" fill="hold">
+                            <p:stCondLst>
+                              <p:cond delay="0"/>
+                            </p:stCondLst>
+                            <p:childTnLst>
+                              <p:par>
+                                <p:cTn id="43" presetID="3" presetClass="entr" presetSubtype="10" fill="hold" nodeType="clickEffect">
+                                  <p:stCondLst>
+                                    <p:cond delay="0"/>
+                                  </p:stCondLst>
+                                  <p:childTnLst>
+                                    <p:set>
+                                      <p:cBhvr>
+                                        <p:cTn id="44" dur="1" fill="hold">
+                                          <p:stCondLst>
+                                            <p:cond delay="0"/>
+                                          </p:stCondLst>
+                                        </p:cTn>
+                                        <p:tgtEl>
+                                          <p:spTgt spid="2050"/>
+                                        </p:tgtEl>
+                                        <p:attrNameLst>
+                                          <p:attrName>style.visibility</p:attrName>
+                                        </p:attrNameLst>
+                                      </p:cBhvr>
+                                      <p:to>
+                                        <p:strVal val="visible"/>
+                                      </p:to>
+                                    </p:set>
+                                    <p:animEffect transition="in" filter="blinds(horizontal)">
+                                      <p:cBhvr>
+                                        <p:cTn id="45" dur="500"/>
+                                        <p:tgtEl>
+                                          <p:spTgt spid="2050"/>
+                                        </p:tgtEl>
+                                      </p:cBhvr>
+                                    </p:animEffect>
+                                  </p:childTnLst>
+                                </p:cTn>
+                              </p:par>
+                            </p:childTnLst>
+                          </p:cTn>
+                        </p:par>
+                      </p:childTnLst>
+                    </p:cTn>
+                  </p:par>
+                  <p:par>
+                    <p:cTn id="46" fill="hold">
+                      <p:stCondLst>
+                        <p:cond delay="indefinite"/>
+                      </p:stCondLst>
+                      <p:childTnLst>
+                        <p:par>
+                          <p:cTn id="47" fill="hold">
+                            <p:stCondLst>
+                              <p:cond delay="0"/>
+                            </p:stCondLst>
+                            <p:childTnLst>
+                              <p:par>
+                                <p:cTn id="48" presetID="6" presetClass="emph" presetSubtype="0" fill="hold" nodeType="clickEffect">
+                                  <p:stCondLst>
+                                    <p:cond delay="0"/>
+                                  </p:stCondLst>
+                                  <p:childTnLst>
+                                    <p:animScale>
+                                      <p:cBhvr>
+                                        <p:cTn id="49" dur="500" fill="hold"/>
+                                        <p:tgtEl>
+                                          <p:spTgt spid="2050"/>
+                                        </p:tgtEl>
+                                      </p:cBhvr>
+                                      <p:by x="25000" y="25000"/>
+                                    </p:animScale>
+                                  </p:childTnLst>
+                                </p:cTn>
+                              </p:par>
+                            </p:childTnLst>
+                          </p:cTn>
+                        </p:par>
+                      </p:childTnLst>
+                    </p:cTn>
+                  </p:par>
+                  <p:par>
+                    <p:cTn id="50" fill="hold">
+                      <p:stCondLst>
+                        <p:cond delay="indefinite"/>
+                      </p:stCondLst>
+                      <p:childTnLst>
+                        <p:par>
+                          <p:cTn id="51" fill="hold">
+                            <p:stCondLst>
+                              <p:cond delay="0"/>
+                            </p:stCondLst>
+                            <p:childTnLst>
+                              <p:par>
+                                <p:cTn id="52" presetID="0" presetClass="path" presetSubtype="0" accel="50000" decel="50000" fill="hold" nodeType="clickEffect">
+                                  <p:stCondLst>
+                                    <p:cond delay="0"/>
+                                  </p:stCondLst>
+                                  <p:childTnLst>
+                                    <p:animMotion origin="layout" path="M 8.05556E-6 -7.40741E-7 L -0.00381 0.06666 L 0.0981 0.0706 L 0.0981 0.09282 L 0.17761 0.09537 " pathEditMode="relative" ptsTypes="AAAAA">
+                                      <p:cBhvr>
+                                        <p:cTn id="53" dur="2000" fill="hold"/>
+                                        <p:tgtEl>
+                                          <p:spTgt spid="2050"/>
+                                        </p:tgtEl>
+                                        <p:attrNameLst>
+                                          <p:attrName>ppt_x</p:attrName>
+                                          <p:attrName>ppt_y</p:attrName>
+                                        </p:attrNameLst>
+                                      </p:cBhvr>
+                                    </p:animMotion>
+                                  </p:childTnLst>
+                                </p:cTn>
+                              </p:par>
+                            </p:childTnLst>
+                          </p:cTn>
+                        </p:par>
+                      </p:childTnLst>
+                    </p:cTn>
+                  </p:par>
+                  <p:par>
+                    <p:cTn id="54" fill="hold">
+                      <p:stCondLst>
+                        <p:cond delay="indefinite"/>
+                      </p:stCondLst>
+                      <p:childTnLst>
+                        <p:par>
+                          <p:cTn id="55" fill="hold">
+                            <p:stCondLst>
+                              <p:cond delay="0"/>
+                            </p:stCondLst>
+                            <p:childTnLst>
+                              <p:par>
+                                <p:cTn id="56" presetID="3" presetClass="exit" presetSubtype="10" fill="hold" nodeType="clickEffect">
+                                  <p:stCondLst>
+                                    <p:cond delay="0"/>
+                                  </p:stCondLst>
+                                  <p:childTnLst>
+                                    <p:animEffect transition="out" filter="blinds(horizontal)">
+                                      <p:cBhvr>
+                                        <p:cTn id="57" dur="500"/>
+                                        <p:tgtEl>
+                                          <p:spTgt spid="2050"/>
+                                        </p:tgtEl>
+                                      </p:cBhvr>
+                                    </p:animEffect>
+                                    <p:set>
+                                      <p:cBhvr>
+                                        <p:cTn id="58" dur="1" fill="hold">
+                                          <p:stCondLst>
+                                            <p:cond delay="499"/>
+                                          </p:stCondLst>
+                                        </p:cTn>
+                                        <p:tgtEl>
+                                          <p:spTgt spid="2050"/>
+                                        </p:tgtEl>
+                                        <p:attrNameLst>
+                                          <p:attrName>style.visibility</p:attrName>
+                                        </p:attrNameLst>
+                                      </p:cBhvr>
+                                      <p:to>
+                                        <p:strVal val="hidden"/>
+                                      </p:to>
+                                    </p:set>
+                                  </p:childTnLst>
+                                </p:cTn>
+                              </p:par>
+                            </p:childTnLst>
+                          </p:cTn>
+                        </p:par>
+                      </p:childTnLst>
+                    </p:cTn>
+                  </p:par>
+                  <p:par>
+                    <p:cTn id="59" fill="hold">
+                      <p:stCondLst>
+                        <p:cond delay="indefinite"/>
+                      </p:stCondLst>
+                      <p:childTnLst>
+                        <p:par>
+                          <p:cTn id="60" fill="hold">
+                            <p:stCondLst>
+                              <p:cond delay="0"/>
+                            </p:stCondLst>
+                            <p:childTnLst>
+                              <p:par>
+                                <p:cTn id="61" presetID="3" presetClass="entr" presetSubtype="10" fill="hold" nodeType="clickEffect">
+                                  <p:stCondLst>
+                                    <p:cond delay="0"/>
+                                  </p:stCondLst>
+                                  <p:childTnLst>
+                                    <p:set>
+                                      <p:cBhvr>
+                                        <p:cTn id="62" dur="1" fill="hold">
+                                          <p:stCondLst>
+                                            <p:cond delay="0"/>
+                                          </p:stCondLst>
+                                        </p:cTn>
+                                        <p:tgtEl>
+                                          <p:spTgt spid="2051"/>
+                                        </p:tgtEl>
+                                        <p:attrNameLst>
+                                          <p:attrName>style.visibility</p:attrName>
+                                        </p:attrNameLst>
+                                      </p:cBhvr>
+                                      <p:to>
+                                        <p:strVal val="visible"/>
+                                      </p:to>
+                                    </p:set>
+                                    <p:animEffect transition="in" filter="blinds(horizontal)">
+                                      <p:cBhvr>
+                                        <p:cTn id="63" dur="500"/>
+                                        <p:tgtEl>
+                                          <p:spTgt spid="2051"/>
+                                        </p:tgtEl>
+                                      </p:cBhvr>
+                                    </p:animEffect>
+                                  </p:childTnLst>
+                                </p:cTn>
+                              </p:par>
+                            </p:childTnLst>
+                          </p:cTn>
+                        </p:par>
+                      </p:childTnLst>
+                    </p:cTn>
+                  </p:par>
+                  <p:par>
+                    <p:cTn id="64" fill="hold">
+                      <p:stCondLst>
+                        <p:cond delay="indefinite"/>
+                      </p:stCondLst>
+                      <p:childTnLst>
+                        <p:par>
+                          <p:cTn id="65" fill="hold">
+                            <p:stCondLst>
+                              <p:cond delay="0"/>
+                            </p:stCondLst>
+                            <p:childTnLst>
+                              <p:par>
+                                <p:cTn id="66" presetID="6" presetClass="emph" presetSubtype="0" fill="hold" nodeType="clickEffect">
+                                  <p:stCondLst>
+                                    <p:cond delay="0"/>
+                                  </p:stCondLst>
+                                  <p:childTnLst>
+                                    <p:animScale>
+                                      <p:cBhvr>
+                                        <p:cTn id="67" dur="500" fill="hold"/>
+                                        <p:tgtEl>
+                                          <p:spTgt spid="2051"/>
+                                        </p:tgtEl>
+                                      </p:cBhvr>
+                                      <p:by x="25000" y="25000"/>
+                                    </p:animScale>
+                                  </p:childTnLst>
+                                </p:cTn>
+                              </p:par>
+                            </p:childTnLst>
+                          </p:cTn>
+                        </p:par>
+                      </p:childTnLst>
+                    </p:cTn>
+                  </p:par>
+                  <p:par>
+                    <p:cTn id="68" fill="hold">
+                      <p:stCondLst>
+                        <p:cond delay="indefinite"/>
+                      </p:stCondLst>
+                      <p:childTnLst>
+                        <p:par>
+                          <p:cTn id="69" fill="hold">
+                            <p:stCondLst>
+                              <p:cond delay="0"/>
+                            </p:stCondLst>
+                            <p:childTnLst>
+                              <p:par>
+                                <p:cTn id="70" presetID="0" presetClass="path" presetSubtype="0" accel="50000" decel="50000" fill="hold" nodeType="clickEffect">
+                                  <p:stCondLst>
+                                    <p:cond delay="0"/>
+                                  </p:stCondLst>
+                                  <p:childTnLst>
+                                    <p:animMotion origin="layout" path="M 3.88889E-6 -6.66667E-6 L -0.00104 -0.06158 L 0.13715 -0.06019 L 0.14705 -0.03542 L 0.26076 -0.03265 L 0.26267 -0.07316 L 0.3941 -0.06922 L 0.39774 0.0574 L 0.51163 0.06666 L 0.51163 0.14235 L 0.62049 0.14513 " pathEditMode="relative" ptsTypes="AAAAAAAAAAA">
+                                      <p:cBhvr>
+                                        <p:cTn id="71" dur="5000" fill="hold"/>
+                                        <p:tgtEl>
+                                          <p:spTgt spid="2051"/>
+                                        </p:tgtEl>
+                                        <p:attrNameLst>
+                                          <p:attrName>ppt_x</p:attrName>
+                                          <p:attrName>ppt_y</p:attrName>
+                                        </p:attrNameLst>
+                                      </p:cBhvr>
+                                    </p:animMotion>
+                                  </p:childTnLst>
+                                </p:cTn>
+                              </p:par>
+                            </p:childTnLst>
+                          </p:cTn>
+                        </p:par>
+                      </p:childTnLst>
+                    </p:cTn>
+                  </p:par>
+                  <p:par>
+                    <p:cTn id="72" fill="hold">
+                      <p:stCondLst>
+                        <p:cond delay="indefinite"/>
+                      </p:stCondLst>
+                      <p:childTnLst>
+                        <p:par>
+                          <p:cTn id="73" fill="hold">
+                            <p:stCondLst>
+                              <p:cond delay="0"/>
+                            </p:stCondLst>
+                            <p:childTnLst>
+                              <p:par>
+                                <p:cTn id="74" presetID="3" presetClass="exit" presetSubtype="10" fill="hold" nodeType="clickEffect">
+                                  <p:stCondLst>
+                                    <p:cond delay="0"/>
+                                  </p:stCondLst>
+                                  <p:childTnLst>
+                                    <p:animEffect transition="out" filter="blinds(horizontal)">
+                                      <p:cBhvr>
+                                        <p:cTn id="75" dur="500"/>
+                                        <p:tgtEl>
+                                          <p:spTgt spid="2051"/>
+                                        </p:tgtEl>
+                                      </p:cBhvr>
+                                    </p:animEffect>
+                                    <p:set>
+                                      <p:cBhvr>
+                                        <p:cTn id="76" dur="1" fill="hold">
+                                          <p:stCondLst>
+                                            <p:cond delay="499"/>
+                                          </p:stCondLst>
+                                        </p:cTn>
+                                        <p:tgtEl>
+                                          <p:spTgt spid="2051"/>
+                                        </p:tgtEl>
+                                        <p:attrNameLst>
+                                          <p:attrName>style.visibility</p:attrName>
+                                        </p:attrNameLst>
+                                      </p:cBhvr>
+                                      <p:to>
+                                        <p:strVal val="hidden"/>
+                                      </p:to>
+                                    </p:set>
+                                  </p:childTnLst>
+                                </p:cTn>
+                              </p:par>
+                            </p:childTnLst>
+                          </p:cTn>
+                        </p:par>
+                      </p:childTnLst>
+                    </p:cTn>
+                  </p:par>
                 </p:childTnLst>
               </p:cTn>
               <p:prevCondLst>
@@ -9556,6 +12913,7 @@
     </p:tnLst>
     <p:bldLst>
       <p:bldP spid="63" grpId="0" animBg="1"/>
+      <p:bldP spid="63" grpId="1" animBg="1"/>
     </p:bldLst>
   </p:timing>
 </p:sld>

</xml_diff>